<commit_message>
make module numbering more consistent
</commit_message>
<xml_diff>
--- a/Images/RNA-seq_Flowchart.pptx
+++ b/Images/RNA-seq_Flowchart.pptx
@@ -291,7 +291,7 @@
           <a:p>
             <a:fld id="{BC7EBC0B-66B3-6748-B539-3251E59579B9}" type="datetimeFigureOut">
               <a:rPr lang="en-US" smtClean="0"/>
-              <a:t>11/15/14</a:t>
+              <a:t>11/16/14</a:t>
             </a:fld>
             <a:endParaRPr lang="en-US"/>
           </a:p>
@@ -461,7 +461,7 @@
           <a:p>
             <a:fld id="{BC7EBC0B-66B3-6748-B539-3251E59579B9}" type="datetimeFigureOut">
               <a:rPr lang="en-US" smtClean="0"/>
-              <a:t>11/15/14</a:t>
+              <a:t>11/16/14</a:t>
             </a:fld>
             <a:endParaRPr lang="en-US"/>
           </a:p>
@@ -641,7 +641,7 @@
           <a:p>
             <a:fld id="{BC7EBC0B-66B3-6748-B539-3251E59579B9}" type="datetimeFigureOut">
               <a:rPr lang="en-US" smtClean="0"/>
-              <a:t>11/15/14</a:t>
+              <a:t>11/16/14</a:t>
             </a:fld>
             <a:endParaRPr lang="en-US"/>
           </a:p>
@@ -811,7 +811,7 @@
           <a:p>
             <a:fld id="{BC7EBC0B-66B3-6748-B539-3251E59579B9}" type="datetimeFigureOut">
               <a:rPr lang="en-US" smtClean="0"/>
-              <a:t>11/15/14</a:t>
+              <a:t>11/16/14</a:t>
             </a:fld>
             <a:endParaRPr lang="en-US"/>
           </a:p>
@@ -1057,7 +1057,7 @@
           <a:p>
             <a:fld id="{BC7EBC0B-66B3-6748-B539-3251E59579B9}" type="datetimeFigureOut">
               <a:rPr lang="en-US" smtClean="0"/>
-              <a:t>11/15/14</a:t>
+              <a:t>11/16/14</a:t>
             </a:fld>
             <a:endParaRPr lang="en-US"/>
           </a:p>
@@ -1345,7 +1345,7 @@
           <a:p>
             <a:fld id="{BC7EBC0B-66B3-6748-B539-3251E59579B9}" type="datetimeFigureOut">
               <a:rPr lang="en-US" smtClean="0"/>
-              <a:t>11/15/14</a:t>
+              <a:t>11/16/14</a:t>
             </a:fld>
             <a:endParaRPr lang="en-US"/>
           </a:p>
@@ -1767,7 +1767,7 @@
           <a:p>
             <a:fld id="{BC7EBC0B-66B3-6748-B539-3251E59579B9}" type="datetimeFigureOut">
               <a:rPr lang="en-US" smtClean="0"/>
-              <a:t>11/15/14</a:t>
+              <a:t>11/16/14</a:t>
             </a:fld>
             <a:endParaRPr lang="en-US"/>
           </a:p>
@@ -1885,7 +1885,7 @@
           <a:p>
             <a:fld id="{BC7EBC0B-66B3-6748-B539-3251E59579B9}" type="datetimeFigureOut">
               <a:rPr lang="en-US" smtClean="0"/>
-              <a:t>11/15/14</a:t>
+              <a:t>11/16/14</a:t>
             </a:fld>
             <a:endParaRPr lang="en-US"/>
           </a:p>
@@ -1980,7 +1980,7 @@
           <a:p>
             <a:fld id="{BC7EBC0B-66B3-6748-B539-3251E59579B9}" type="datetimeFigureOut">
               <a:rPr lang="en-US" smtClean="0"/>
-              <a:t>11/15/14</a:t>
+              <a:t>11/16/14</a:t>
             </a:fld>
             <a:endParaRPr lang="en-US"/>
           </a:p>
@@ -2257,7 +2257,7 @@
           <a:p>
             <a:fld id="{BC7EBC0B-66B3-6748-B539-3251E59579B9}" type="datetimeFigureOut">
               <a:rPr lang="en-US" smtClean="0"/>
-              <a:t>11/15/14</a:t>
+              <a:t>11/16/14</a:t>
             </a:fld>
             <a:endParaRPr lang="en-US"/>
           </a:p>
@@ -2510,7 +2510,7 @@
           <a:p>
             <a:fld id="{BC7EBC0B-66B3-6748-B539-3251E59579B9}" type="datetimeFigureOut">
               <a:rPr lang="en-US" smtClean="0"/>
-              <a:t>11/15/14</a:t>
+              <a:t>11/16/14</a:t>
             </a:fld>
             <a:endParaRPr lang="en-US"/>
           </a:p>
@@ -2723,7 +2723,7 @@
           <a:p>
             <a:fld id="{BC7EBC0B-66B3-6748-B539-3251E59579B9}" type="datetimeFigureOut">
               <a:rPr lang="en-US" smtClean="0"/>
-              <a:t>11/15/14</a:t>
+              <a:t>11/16/14</a:t>
             </a:fld>
             <a:endParaRPr lang="en-US"/>
           </a:p>
@@ -5370,7 +5370,7 @@
         <p:spPr bwMode="auto">
           <a:xfrm>
             <a:off x="2411141" y="5515698"/>
-            <a:ext cx="1074738" cy="338137"/>
+            <a:ext cx="1073832" cy="338554"/>
           </a:xfrm>
           <a:prstGeom prst="rect">
             <a:avLst/>
@@ -5514,9 +5514,14 @@
           <a:p>
             <a:pPr eaLnBrk="1" hangingPunct="1"/>
             <a:r>
-              <a:rPr lang="en-US" sz="1600" b="1"/>
-              <a:t>Module 1</a:t>
+              <a:rPr lang="en-US" sz="1600" b="1" dirty="0"/>
+              <a:t>Module </a:t>
             </a:r>
+            <a:r>
+              <a:rPr lang="en-US" sz="1600" b="1" dirty="0" smtClean="0"/>
+              <a:t>2</a:t>
+            </a:r>
+            <a:endParaRPr lang="en-US" sz="1600" b="1" dirty="0"/>
           </a:p>
         </p:txBody>
       </p:sp>
@@ -7700,7 +7705,7 @@
         <p:spPr bwMode="auto">
           <a:xfrm>
             <a:off x="1228725" y="1371330"/>
-            <a:ext cx="1073150" cy="338138"/>
+            <a:ext cx="1073832" cy="338554"/>
           </a:xfrm>
           <a:prstGeom prst="rect">
             <a:avLst/>
@@ -7844,9 +7849,14 @@
           <a:p>
             <a:pPr eaLnBrk="1" hangingPunct="1"/>
             <a:r>
-              <a:rPr lang="en-US" sz="1600" b="1"/>
-              <a:t>Module 2</a:t>
+              <a:rPr lang="en-US" sz="1600" b="1" dirty="0"/>
+              <a:t>Module </a:t>
             </a:r>
+            <a:r>
+              <a:rPr lang="en-US" sz="1600" b="1" dirty="0" smtClean="0"/>
+              <a:t>3</a:t>
+            </a:r>
+            <a:endParaRPr lang="en-US" sz="1600" b="1" dirty="0"/>
           </a:p>
         </p:txBody>
       </p:sp>
@@ -7974,7 +7984,7 @@
         <p:spPr bwMode="auto">
           <a:xfrm>
             <a:off x="6230938" y="5229225"/>
-            <a:ext cx="1074737" cy="338138"/>
+            <a:ext cx="1073832" cy="338554"/>
           </a:xfrm>
           <a:prstGeom prst="rect">
             <a:avLst/>
@@ -8118,9 +8128,14 @@
           <a:p>
             <a:pPr eaLnBrk="1" hangingPunct="1"/>
             <a:r>
-              <a:rPr lang="en-US" sz="1600" b="1"/>
-              <a:t>Module 3</a:t>
+              <a:rPr lang="en-US" sz="1600" b="1" dirty="0"/>
+              <a:t>Module </a:t>
             </a:r>
+            <a:r>
+              <a:rPr lang="en-US" sz="1600" b="1" dirty="0" smtClean="0"/>
+              <a:t>4</a:t>
+            </a:r>
+            <a:endParaRPr lang="en-US" sz="1600" b="1" dirty="0"/>
           </a:p>
         </p:txBody>
       </p:sp>
@@ -10570,8 +10585,20 @@
           <a:p>
             <a:pPr eaLnBrk="1" hangingPunct="1"/>
             <a:r>
-              <a:rPr lang="en-US" sz="1600" b="1"/>
-              <a:t>Module 4 – Rerun Cufflinks in alternative ‘modes’</a:t>
+              <a:rPr lang="en-US" sz="1600" b="1" dirty="0"/>
+              <a:t>Module </a:t>
+            </a:r>
+            <a:r>
+              <a:rPr lang="en-US" sz="1600" b="1" dirty="0"/>
+              <a:t>5</a:t>
+            </a:r>
+            <a:r>
+              <a:rPr lang="en-US" sz="1600" b="1" dirty="0" smtClean="0"/>
+              <a:t> </a:t>
+            </a:r>
+            <a:r>
+              <a:rPr lang="en-US" sz="1600" b="1" dirty="0"/>
+              <a:t>– Rerun Cufflinks in alternative ‘modes’</a:t>
             </a:r>
           </a:p>
         </p:txBody>

</xml_diff>

<commit_message>
update flowcharts to harmonize module numbers
</commit_message>
<xml_diff>
--- a/Images/RNA-seq_Flowchart.pptx
+++ b/Images/RNA-seq_Flowchart.pptx
@@ -5,10 +5,11 @@
     <p:sldMasterId id="2147483648" r:id="rId1"/>
   </p:sldMasterIdLst>
   <p:sldIdLst>
-    <p:sldId id="256" r:id="rId2"/>
-    <p:sldId id="258" r:id="rId3"/>
-    <p:sldId id="257" r:id="rId4"/>
-    <p:sldId id="260" r:id="rId5"/>
+    <p:sldId id="261" r:id="rId2"/>
+    <p:sldId id="256" r:id="rId3"/>
+    <p:sldId id="258" r:id="rId4"/>
+    <p:sldId id="257" r:id="rId5"/>
+    <p:sldId id="260" r:id="rId6"/>
   </p:sldIdLst>
   <p:sldSz cx="9144000" cy="6858000" type="screen4x3"/>
   <p:notesSz cx="6858000" cy="9144000"/>
@@ -291,7 +292,7 @@
           <a:p>
             <a:fld id="{BC7EBC0B-66B3-6748-B539-3251E59579B9}" type="datetimeFigureOut">
               <a:rPr lang="en-US" smtClean="0"/>
-              <a:t>11/16/14</a:t>
+              <a:t>4/29/15</a:t>
             </a:fld>
             <a:endParaRPr lang="en-US"/>
           </a:p>
@@ -461,7 +462,7 @@
           <a:p>
             <a:fld id="{BC7EBC0B-66B3-6748-B539-3251E59579B9}" type="datetimeFigureOut">
               <a:rPr lang="en-US" smtClean="0"/>
-              <a:t>11/16/14</a:t>
+              <a:t>4/29/15</a:t>
             </a:fld>
             <a:endParaRPr lang="en-US"/>
           </a:p>
@@ -641,7 +642,7 @@
           <a:p>
             <a:fld id="{BC7EBC0B-66B3-6748-B539-3251E59579B9}" type="datetimeFigureOut">
               <a:rPr lang="en-US" smtClean="0"/>
-              <a:t>11/16/14</a:t>
+              <a:t>4/29/15</a:t>
             </a:fld>
             <a:endParaRPr lang="en-US"/>
           </a:p>
@@ -811,7 +812,7 @@
           <a:p>
             <a:fld id="{BC7EBC0B-66B3-6748-B539-3251E59579B9}" type="datetimeFigureOut">
               <a:rPr lang="en-US" smtClean="0"/>
-              <a:t>11/16/14</a:t>
+              <a:t>4/29/15</a:t>
             </a:fld>
             <a:endParaRPr lang="en-US"/>
           </a:p>
@@ -1057,7 +1058,7 @@
           <a:p>
             <a:fld id="{BC7EBC0B-66B3-6748-B539-3251E59579B9}" type="datetimeFigureOut">
               <a:rPr lang="en-US" smtClean="0"/>
-              <a:t>11/16/14</a:t>
+              <a:t>4/29/15</a:t>
             </a:fld>
             <a:endParaRPr lang="en-US"/>
           </a:p>
@@ -1345,7 +1346,7 @@
           <a:p>
             <a:fld id="{BC7EBC0B-66B3-6748-B539-3251E59579B9}" type="datetimeFigureOut">
               <a:rPr lang="en-US" smtClean="0"/>
-              <a:t>11/16/14</a:t>
+              <a:t>4/29/15</a:t>
             </a:fld>
             <a:endParaRPr lang="en-US"/>
           </a:p>
@@ -1767,7 +1768,7 @@
           <a:p>
             <a:fld id="{BC7EBC0B-66B3-6748-B539-3251E59579B9}" type="datetimeFigureOut">
               <a:rPr lang="en-US" smtClean="0"/>
-              <a:t>11/16/14</a:t>
+              <a:t>4/29/15</a:t>
             </a:fld>
             <a:endParaRPr lang="en-US"/>
           </a:p>
@@ -1885,7 +1886,7 @@
           <a:p>
             <a:fld id="{BC7EBC0B-66B3-6748-B539-3251E59579B9}" type="datetimeFigureOut">
               <a:rPr lang="en-US" smtClean="0"/>
-              <a:t>11/16/14</a:t>
+              <a:t>4/29/15</a:t>
             </a:fld>
             <a:endParaRPr lang="en-US"/>
           </a:p>
@@ -1980,7 +1981,7 @@
           <a:p>
             <a:fld id="{BC7EBC0B-66B3-6748-B539-3251E59579B9}" type="datetimeFigureOut">
               <a:rPr lang="en-US" smtClean="0"/>
-              <a:t>11/16/14</a:t>
+              <a:t>4/29/15</a:t>
             </a:fld>
             <a:endParaRPr lang="en-US"/>
           </a:p>
@@ -2257,7 +2258,7 @@
           <a:p>
             <a:fld id="{BC7EBC0B-66B3-6748-B539-3251E59579B9}" type="datetimeFigureOut">
               <a:rPr lang="en-US" smtClean="0"/>
-              <a:t>11/16/14</a:t>
+              <a:t>4/29/15</a:t>
             </a:fld>
             <a:endParaRPr lang="en-US"/>
           </a:p>
@@ -2510,7 +2511,7 @@
           <a:p>
             <a:fld id="{BC7EBC0B-66B3-6748-B539-3251E59579B9}" type="datetimeFigureOut">
               <a:rPr lang="en-US" smtClean="0"/>
-              <a:t>11/16/14</a:t>
+              <a:t>4/29/15</a:t>
             </a:fld>
             <a:endParaRPr lang="en-US"/>
           </a:p>
@@ -2723,7 +2724,7 @@
           <a:p>
             <a:fld id="{BC7EBC0B-66B3-6748-B539-3251E59579B9}" type="datetimeFigureOut">
               <a:rPr lang="en-US" smtClean="0"/>
-              <a:t>11/16/14</a:t>
+              <a:t>4/29/15</a:t>
             </a:fld>
             <a:endParaRPr lang="en-US"/>
           </a:p>
@@ -5359,6 +5360,2297 @@
           </a:p>
         </p:txBody>
       </p:sp>
+    </p:spTree>
+    <p:extLst>
+      <p:ext uri="{BB962C8B-B14F-4D97-AF65-F5344CB8AC3E}">
+        <p14:creationId xmlns:p14="http://schemas.microsoft.com/office/powerpoint/2010/main" val="969105560"/>
+      </p:ext>
+    </p:extLst>
+  </p:cSld>
+  <p:clrMapOvr>
+    <a:masterClrMapping/>
+  </p:clrMapOvr>
+</p:sld>
+</file>
+
+<file path=ppt/slides/slide2.xml><?xml version="1.0" encoding="utf-8"?>
+<p:sld xmlns:a="http://schemas.openxmlformats.org/drawingml/2006/main" xmlns:r="http://schemas.openxmlformats.org/officeDocument/2006/relationships" xmlns:p="http://schemas.openxmlformats.org/presentationml/2006/main">
+  <p:cSld>
+    <p:spTree>
+      <p:nvGrpSpPr>
+        <p:cNvPr id="1" name=""/>
+        <p:cNvGrpSpPr/>
+        <p:nvPr/>
+      </p:nvGrpSpPr>
+      <p:grpSpPr>
+        <a:xfrm>
+          <a:off x="0" y="0"/>
+          <a:ext cx="0" cy="0"/>
+          <a:chOff x="0" y="0"/>
+          <a:chExt cx="0" cy="0"/>
+        </a:xfrm>
+      </p:grpSpPr>
+      <p:sp>
+        <p:nvSpPr>
+          <p:cNvPr id="4" name="Rounded Rectangle 3"/>
+          <p:cNvSpPr/>
+          <p:nvPr/>
+        </p:nvSpPr>
+        <p:spPr>
+          <a:xfrm>
+            <a:off x="356916" y="3405910"/>
+            <a:ext cx="5184775" cy="2087563"/>
+          </a:xfrm>
+          <a:prstGeom prst="roundRect">
+            <a:avLst/>
+          </a:prstGeom>
+          <a:gradFill flip="none" rotWithShape="1">
+            <a:gsLst>
+              <a:gs pos="0">
+                <a:schemeClr val="dk1">
+                  <a:tint val="50000"/>
+                  <a:satMod val="300000"/>
+                  <a:alpha val="13000"/>
+                </a:schemeClr>
+              </a:gs>
+              <a:gs pos="35000">
+                <a:schemeClr val="dk1">
+                  <a:tint val="37000"/>
+                  <a:satMod val="300000"/>
+                  <a:alpha val="13000"/>
+                </a:schemeClr>
+              </a:gs>
+              <a:gs pos="100000">
+                <a:schemeClr val="dk1">
+                  <a:tint val="15000"/>
+                  <a:satMod val="350000"/>
+                  <a:alpha val="13000"/>
+                </a:schemeClr>
+              </a:gs>
+            </a:gsLst>
+            <a:lin ang="16200000" scaled="1"/>
+            <a:tileRect/>
+          </a:gradFill>
+          <a:ln>
+            <a:prstDash val="dash"/>
+          </a:ln>
+        </p:spPr>
+        <p:style>
+          <a:lnRef idx="1">
+            <a:schemeClr val="dk1"/>
+          </a:lnRef>
+          <a:fillRef idx="2">
+            <a:schemeClr val="dk1"/>
+          </a:fillRef>
+          <a:effectRef idx="1">
+            <a:schemeClr val="dk1"/>
+          </a:effectRef>
+          <a:fontRef idx="minor">
+            <a:schemeClr val="dk1"/>
+          </a:fontRef>
+        </p:style>
+        <p:txBody>
+          <a:bodyPr anchor="ctr"/>
+          <a:lstStyle/>
+          <a:p>
+            <a:pPr algn="ctr">
+              <a:defRPr/>
+            </a:pPr>
+            <a:endParaRPr lang="en-US">
+              <a:ln w="76200" cmpd="sng">
+                <a:noFill/>
+                <a:prstDash val="dot"/>
+              </a:ln>
+              <a:noFill/>
+            </a:endParaRPr>
+          </a:p>
+        </p:txBody>
+      </p:sp>
+      <p:sp>
+        <p:nvSpPr>
+          <p:cNvPr id="5" name="Rounded Rectangle 4"/>
+          <p:cNvSpPr/>
+          <p:nvPr/>
+        </p:nvSpPr>
+        <p:spPr bwMode="auto">
+          <a:xfrm>
+            <a:off x="428354" y="3621810"/>
+            <a:ext cx="4824412" cy="1008063"/>
+          </a:xfrm>
+          <a:prstGeom prst="roundRect">
+            <a:avLst/>
+          </a:prstGeom>
+          <a:gradFill flip="none" rotWithShape="1">
+            <a:gsLst>
+              <a:gs pos="0">
+                <a:schemeClr val="dk1">
+                  <a:tint val="50000"/>
+                  <a:satMod val="300000"/>
+                  <a:alpha val="51000"/>
+                </a:schemeClr>
+              </a:gs>
+              <a:gs pos="35000">
+                <a:schemeClr val="dk1">
+                  <a:tint val="37000"/>
+                  <a:satMod val="300000"/>
+                  <a:alpha val="51000"/>
+                </a:schemeClr>
+              </a:gs>
+              <a:gs pos="100000">
+                <a:schemeClr val="dk1">
+                  <a:tint val="15000"/>
+                  <a:satMod val="350000"/>
+                  <a:alpha val="51000"/>
+                </a:schemeClr>
+              </a:gs>
+            </a:gsLst>
+            <a:lin ang="16200000" scaled="1"/>
+            <a:tileRect/>
+          </a:gradFill>
+        </p:spPr>
+        <p:style>
+          <a:lnRef idx="1">
+            <a:schemeClr val="dk1"/>
+          </a:lnRef>
+          <a:fillRef idx="2">
+            <a:schemeClr val="dk1"/>
+          </a:fillRef>
+          <a:effectRef idx="1">
+            <a:schemeClr val="dk1"/>
+          </a:effectRef>
+          <a:fontRef idx="minor">
+            <a:schemeClr val="dk1"/>
+          </a:fontRef>
+        </p:style>
+        <p:txBody>
+          <a:bodyPr anchor="ctr"/>
+          <a:lstStyle/>
+          <a:p>
+            <a:pPr algn="ctr">
+              <a:defRPr/>
+            </a:pPr>
+            <a:endParaRPr lang="en-US" sz="1200" dirty="0">
+              <a:solidFill>
+                <a:schemeClr val="tx1"/>
+              </a:solidFill>
+            </a:endParaRPr>
+          </a:p>
+        </p:txBody>
+      </p:sp>
+      <p:grpSp>
+        <p:nvGrpSpPr>
+          <p:cNvPr id="6" name="Group 6"/>
+          <p:cNvGrpSpPr>
+            <a:grpSpLocks/>
+          </p:cNvGrpSpPr>
+          <p:nvPr/>
+        </p:nvGrpSpPr>
+        <p:grpSpPr bwMode="auto">
+          <a:xfrm>
+            <a:off x="499791" y="1902548"/>
+            <a:ext cx="1368425" cy="1287462"/>
+            <a:chOff x="251520" y="1926414"/>
+            <a:chExt cx="1368152" cy="1286562"/>
+          </a:xfrm>
+        </p:grpSpPr>
+        <p:sp>
+          <p:nvSpPr>
+            <p:cNvPr id="7" name="Rounded Rectangle 6"/>
+            <p:cNvSpPr/>
+            <p:nvPr/>
+          </p:nvSpPr>
+          <p:spPr>
+            <a:xfrm>
+              <a:off x="251520" y="2492755"/>
+              <a:ext cx="1368152" cy="720221"/>
+            </a:xfrm>
+            <a:prstGeom prst="roundRect">
+              <a:avLst/>
+            </a:prstGeom>
+          </p:spPr>
+          <p:style>
+            <a:lnRef idx="1">
+              <a:schemeClr val="accent3"/>
+            </a:lnRef>
+            <a:fillRef idx="2">
+              <a:schemeClr val="accent3"/>
+            </a:fillRef>
+            <a:effectRef idx="1">
+              <a:schemeClr val="accent3"/>
+            </a:effectRef>
+            <a:fontRef idx="minor">
+              <a:schemeClr val="dk1"/>
+            </a:fontRef>
+          </p:style>
+          <p:txBody>
+            <a:bodyPr anchor="ctr"/>
+            <a:lstStyle/>
+            <a:p>
+              <a:pPr algn="ctr">
+                <a:defRPr/>
+              </a:pPr>
+              <a:r>
+                <a:rPr lang="en-US" sz="1200" dirty="0">
+                  <a:solidFill>
+                    <a:schemeClr val="tx1"/>
+                  </a:solidFill>
+                </a:rPr>
+                <a:t>RNA-</a:t>
+              </a:r>
+              <a:r>
+                <a:rPr lang="en-US" sz="1200" dirty="0" err="1">
+                  <a:solidFill>
+                    <a:schemeClr val="tx1"/>
+                  </a:solidFill>
+                </a:rPr>
+                <a:t>seq</a:t>
+              </a:r>
+              <a:r>
+                <a:rPr lang="en-US" sz="1200" dirty="0">
+                  <a:solidFill>
+                    <a:schemeClr val="tx1"/>
+                  </a:solidFill>
+                </a:rPr>
+                <a:t> reads (2 x 100 </a:t>
+              </a:r>
+              <a:r>
+                <a:rPr lang="en-US" sz="1200" dirty="0" err="1">
+                  <a:solidFill>
+                    <a:schemeClr val="tx1"/>
+                  </a:solidFill>
+                </a:rPr>
+                <a:t>bp</a:t>
+              </a:r>
+              <a:r>
+                <a:rPr lang="en-US" sz="1200" dirty="0">
+                  <a:solidFill>
+                    <a:schemeClr val="tx1"/>
+                  </a:solidFill>
+                </a:rPr>
+                <a:t>)</a:t>
+              </a:r>
+            </a:p>
+          </p:txBody>
+        </p:sp>
+        <p:sp>
+          <p:nvSpPr>
+            <p:cNvPr id="8" name="TextBox 3"/>
+            <p:cNvSpPr txBox="1">
+              <a:spLocks noChangeArrowheads="1"/>
+            </p:cNvSpPr>
+            <p:nvPr/>
+          </p:nvSpPr>
+          <p:spPr bwMode="auto">
+            <a:xfrm>
+              <a:off x="334504" y="1926414"/>
+              <a:ext cx="1202185" cy="307777"/>
+            </a:xfrm>
+            <a:prstGeom prst="rect">
+              <a:avLst/>
+            </a:prstGeom>
+            <a:noFill/>
+            <a:ln>
+              <a:noFill/>
+            </a:ln>
+            <a:extLst>
+              <a:ext uri="{909E8E84-426E-40dd-AFC4-6F175D3DCCD1}">
+                <a14:hiddenFill xmlns:a14="http://schemas.microsoft.com/office/drawing/2010/main">
+                  <a:solidFill>
+                    <a:srgbClr val="FFFFFF"/>
+                  </a:solidFill>
+                </a14:hiddenFill>
+              </a:ext>
+              <a:ext uri="{91240B29-F687-4f45-9708-019B960494DF}">
+                <a14:hiddenLine xmlns:a14="http://schemas.microsoft.com/office/drawing/2010/main" w="9525">
+                  <a:solidFill>
+                    <a:srgbClr val="000000"/>
+                  </a:solidFill>
+                  <a:miter lim="800000"/>
+                  <a:headEnd/>
+                  <a:tailEnd/>
+                </a14:hiddenLine>
+              </a:ext>
+            </a:extLst>
+          </p:spPr>
+          <p:txBody>
+            <a:bodyPr wrap="none">
+              <a:spAutoFit/>
+            </a:bodyPr>
+            <a:lstStyle>
+              <a:lvl1pPr eaLnBrk="0" hangingPunct="0">
+                <a:defRPr sz="2400">
+                  <a:solidFill>
+                    <a:schemeClr val="tx1"/>
+                  </a:solidFill>
+                  <a:latin typeface="Arial" charset="0"/>
+                  <a:ea typeface="ＭＳ Ｐゴシック" charset="0"/>
+                  <a:cs typeface="ＭＳ Ｐゴシック" charset="0"/>
+                </a:defRPr>
+              </a:lvl1pPr>
+              <a:lvl2pPr marL="742950" indent="-285750" eaLnBrk="0" hangingPunct="0">
+                <a:defRPr sz="2400">
+                  <a:solidFill>
+                    <a:schemeClr val="tx1"/>
+                  </a:solidFill>
+                  <a:latin typeface="Arial" charset="0"/>
+                  <a:ea typeface="ＭＳ Ｐゴシック" charset="0"/>
+                </a:defRPr>
+              </a:lvl2pPr>
+              <a:lvl3pPr marL="1143000" indent="-228600" eaLnBrk="0" hangingPunct="0">
+                <a:defRPr sz="2400">
+                  <a:solidFill>
+                    <a:schemeClr val="tx1"/>
+                  </a:solidFill>
+                  <a:latin typeface="Arial" charset="0"/>
+                  <a:ea typeface="ＭＳ Ｐゴシック" charset="0"/>
+                </a:defRPr>
+              </a:lvl3pPr>
+              <a:lvl4pPr marL="1600200" indent="-228600" eaLnBrk="0" hangingPunct="0">
+                <a:defRPr sz="2400">
+                  <a:solidFill>
+                    <a:schemeClr val="tx1"/>
+                  </a:solidFill>
+                  <a:latin typeface="Arial" charset="0"/>
+                  <a:ea typeface="ＭＳ Ｐゴシック" charset="0"/>
+                </a:defRPr>
+              </a:lvl4pPr>
+              <a:lvl5pPr marL="2057400" indent="-228600" eaLnBrk="0" hangingPunct="0">
+                <a:defRPr sz="2400">
+                  <a:solidFill>
+                    <a:schemeClr val="tx1"/>
+                  </a:solidFill>
+                  <a:latin typeface="Arial" charset="0"/>
+                  <a:ea typeface="ＭＳ Ｐゴシック" charset="0"/>
+                </a:defRPr>
+              </a:lvl5pPr>
+              <a:lvl6pPr marL="2514600" indent="-228600" eaLnBrk="0" fontAlgn="base" hangingPunct="0">
+                <a:spcBef>
+                  <a:spcPct val="0"/>
+                </a:spcBef>
+                <a:spcAft>
+                  <a:spcPct val="0"/>
+                </a:spcAft>
+                <a:defRPr sz="2400">
+                  <a:solidFill>
+                    <a:schemeClr val="tx1"/>
+                  </a:solidFill>
+                  <a:latin typeface="Arial" charset="0"/>
+                  <a:ea typeface="ＭＳ Ｐゴシック" charset="0"/>
+                </a:defRPr>
+              </a:lvl6pPr>
+              <a:lvl7pPr marL="2971800" indent="-228600" eaLnBrk="0" fontAlgn="base" hangingPunct="0">
+                <a:spcBef>
+                  <a:spcPct val="0"/>
+                </a:spcBef>
+                <a:spcAft>
+                  <a:spcPct val="0"/>
+                </a:spcAft>
+                <a:defRPr sz="2400">
+                  <a:solidFill>
+                    <a:schemeClr val="tx1"/>
+                  </a:solidFill>
+                  <a:latin typeface="Arial" charset="0"/>
+                  <a:ea typeface="ＭＳ Ｐゴシック" charset="0"/>
+                </a:defRPr>
+              </a:lvl7pPr>
+              <a:lvl8pPr marL="3429000" indent="-228600" eaLnBrk="0" fontAlgn="base" hangingPunct="0">
+                <a:spcBef>
+                  <a:spcPct val="0"/>
+                </a:spcBef>
+                <a:spcAft>
+                  <a:spcPct val="0"/>
+                </a:spcAft>
+                <a:defRPr sz="2400">
+                  <a:solidFill>
+                    <a:schemeClr val="tx1"/>
+                  </a:solidFill>
+                  <a:latin typeface="Arial" charset="0"/>
+                  <a:ea typeface="ＭＳ Ｐゴシック" charset="0"/>
+                </a:defRPr>
+              </a:lvl8pPr>
+              <a:lvl9pPr marL="3886200" indent="-228600" eaLnBrk="0" fontAlgn="base" hangingPunct="0">
+                <a:spcBef>
+                  <a:spcPct val="0"/>
+                </a:spcBef>
+                <a:spcAft>
+                  <a:spcPct val="0"/>
+                </a:spcAft>
+                <a:defRPr sz="2400">
+                  <a:solidFill>
+                    <a:schemeClr val="tx1"/>
+                  </a:solidFill>
+                  <a:latin typeface="Arial" charset="0"/>
+                  <a:ea typeface="ＭＳ Ｐゴシック" charset="0"/>
+                </a:defRPr>
+              </a:lvl9pPr>
+            </a:lstStyle>
+            <a:p>
+              <a:pPr eaLnBrk="1" hangingPunct="1"/>
+              <a:r>
+                <a:rPr lang="en-US" sz="1400" b="1"/>
+                <a:t>Sequencing</a:t>
+              </a:r>
+            </a:p>
+          </p:txBody>
+        </p:sp>
+      </p:grpSp>
+      <p:grpSp>
+        <p:nvGrpSpPr>
+          <p:cNvPr id="9" name="Group 16"/>
+          <p:cNvGrpSpPr>
+            <a:grpSpLocks/>
+          </p:cNvGrpSpPr>
+          <p:nvPr/>
+        </p:nvGrpSpPr>
+        <p:grpSpPr bwMode="auto">
+          <a:xfrm>
+            <a:off x="2165079" y="1796185"/>
+            <a:ext cx="1368425" cy="1393825"/>
+            <a:chOff x="1916196" y="1818692"/>
+            <a:chExt cx="1368152" cy="1394284"/>
+          </a:xfrm>
+        </p:grpSpPr>
+        <p:sp>
+          <p:nvSpPr>
+            <p:cNvPr id="10" name="Rounded Rectangle 9"/>
+            <p:cNvSpPr/>
+            <p:nvPr/>
+          </p:nvSpPr>
+          <p:spPr>
+            <a:xfrm>
+              <a:off x="1916196" y="2493602"/>
+              <a:ext cx="1368152" cy="719374"/>
+            </a:xfrm>
+            <a:prstGeom prst="roundRect">
+              <a:avLst/>
+            </a:prstGeom>
+          </p:spPr>
+          <p:style>
+            <a:lnRef idx="1">
+              <a:schemeClr val="accent4"/>
+            </a:lnRef>
+            <a:fillRef idx="2">
+              <a:schemeClr val="accent4"/>
+            </a:fillRef>
+            <a:effectRef idx="1">
+              <a:schemeClr val="accent4"/>
+            </a:effectRef>
+            <a:fontRef idx="minor">
+              <a:schemeClr val="dk1"/>
+            </a:fontRef>
+          </p:style>
+          <p:txBody>
+            <a:bodyPr anchor="ctr"/>
+            <a:lstStyle/>
+            <a:p>
+              <a:pPr algn="ctr">
+                <a:defRPr/>
+              </a:pPr>
+              <a:r>
+                <a:rPr lang="en-US" sz="1200" dirty="0">
+                  <a:solidFill>
+                    <a:schemeClr val="tx1"/>
+                  </a:solidFill>
+                </a:rPr>
+                <a:t>Bowtie/</a:t>
+              </a:r>
+              <a:r>
+                <a:rPr lang="en-US" sz="1200" dirty="0" err="1">
+                  <a:solidFill>
+                    <a:schemeClr val="tx1"/>
+                  </a:solidFill>
+                </a:rPr>
+                <a:t>TopHat</a:t>
+              </a:r>
+              <a:r>
+                <a:rPr lang="en-US" sz="1200" dirty="0">
+                  <a:solidFill>
+                    <a:schemeClr val="tx1"/>
+                  </a:solidFill>
+                </a:rPr>
+                <a:t> alignment (genome)</a:t>
+              </a:r>
+            </a:p>
+          </p:txBody>
+        </p:sp>
+        <p:sp>
+          <p:nvSpPr>
+            <p:cNvPr id="11" name="TextBox 12"/>
+            <p:cNvSpPr txBox="1">
+              <a:spLocks noChangeArrowheads="1"/>
+            </p:cNvSpPr>
+            <p:nvPr/>
+          </p:nvSpPr>
+          <p:spPr bwMode="auto">
+            <a:xfrm>
+              <a:off x="1978694" y="1818692"/>
+              <a:ext cx="1243156" cy="523220"/>
+            </a:xfrm>
+            <a:prstGeom prst="rect">
+              <a:avLst/>
+            </a:prstGeom>
+            <a:noFill/>
+            <a:ln>
+              <a:noFill/>
+            </a:ln>
+            <a:extLst>
+              <a:ext uri="{909E8E84-426E-40dd-AFC4-6F175D3DCCD1}">
+                <a14:hiddenFill xmlns:a14="http://schemas.microsoft.com/office/drawing/2010/main">
+                  <a:solidFill>
+                    <a:srgbClr val="FFFFFF"/>
+                  </a:solidFill>
+                </a14:hiddenFill>
+              </a:ext>
+              <a:ext uri="{91240B29-F687-4f45-9708-019B960494DF}">
+                <a14:hiddenLine xmlns:a14="http://schemas.microsoft.com/office/drawing/2010/main" w="9525">
+                  <a:solidFill>
+                    <a:srgbClr val="000000"/>
+                  </a:solidFill>
+                  <a:miter lim="800000"/>
+                  <a:headEnd/>
+                  <a:tailEnd/>
+                </a14:hiddenLine>
+              </a:ext>
+            </a:extLst>
+          </p:spPr>
+          <p:txBody>
+            <a:bodyPr>
+              <a:spAutoFit/>
+            </a:bodyPr>
+            <a:lstStyle>
+              <a:lvl1pPr eaLnBrk="0" hangingPunct="0">
+                <a:defRPr sz="2400">
+                  <a:solidFill>
+                    <a:schemeClr val="tx1"/>
+                  </a:solidFill>
+                  <a:latin typeface="Arial" charset="0"/>
+                  <a:ea typeface="ＭＳ Ｐゴシック" charset="0"/>
+                  <a:cs typeface="ＭＳ Ｐゴシック" charset="0"/>
+                </a:defRPr>
+              </a:lvl1pPr>
+              <a:lvl2pPr marL="742950" indent="-285750" eaLnBrk="0" hangingPunct="0">
+                <a:defRPr sz="2400">
+                  <a:solidFill>
+                    <a:schemeClr val="tx1"/>
+                  </a:solidFill>
+                  <a:latin typeface="Arial" charset="0"/>
+                  <a:ea typeface="ＭＳ Ｐゴシック" charset="0"/>
+                </a:defRPr>
+              </a:lvl2pPr>
+              <a:lvl3pPr marL="1143000" indent="-228600" eaLnBrk="0" hangingPunct="0">
+                <a:defRPr sz="2400">
+                  <a:solidFill>
+                    <a:schemeClr val="tx1"/>
+                  </a:solidFill>
+                  <a:latin typeface="Arial" charset="0"/>
+                  <a:ea typeface="ＭＳ Ｐゴシック" charset="0"/>
+                </a:defRPr>
+              </a:lvl3pPr>
+              <a:lvl4pPr marL="1600200" indent="-228600" eaLnBrk="0" hangingPunct="0">
+                <a:defRPr sz="2400">
+                  <a:solidFill>
+                    <a:schemeClr val="tx1"/>
+                  </a:solidFill>
+                  <a:latin typeface="Arial" charset="0"/>
+                  <a:ea typeface="ＭＳ Ｐゴシック" charset="0"/>
+                </a:defRPr>
+              </a:lvl4pPr>
+              <a:lvl5pPr marL="2057400" indent="-228600" eaLnBrk="0" hangingPunct="0">
+                <a:defRPr sz="2400">
+                  <a:solidFill>
+                    <a:schemeClr val="tx1"/>
+                  </a:solidFill>
+                  <a:latin typeface="Arial" charset="0"/>
+                  <a:ea typeface="ＭＳ Ｐゴシック" charset="0"/>
+                </a:defRPr>
+              </a:lvl5pPr>
+              <a:lvl6pPr marL="2514600" indent="-228600" eaLnBrk="0" fontAlgn="base" hangingPunct="0">
+                <a:spcBef>
+                  <a:spcPct val="0"/>
+                </a:spcBef>
+                <a:spcAft>
+                  <a:spcPct val="0"/>
+                </a:spcAft>
+                <a:defRPr sz="2400">
+                  <a:solidFill>
+                    <a:schemeClr val="tx1"/>
+                  </a:solidFill>
+                  <a:latin typeface="Arial" charset="0"/>
+                  <a:ea typeface="ＭＳ Ｐゴシック" charset="0"/>
+                </a:defRPr>
+              </a:lvl6pPr>
+              <a:lvl7pPr marL="2971800" indent="-228600" eaLnBrk="0" fontAlgn="base" hangingPunct="0">
+                <a:spcBef>
+                  <a:spcPct val="0"/>
+                </a:spcBef>
+                <a:spcAft>
+                  <a:spcPct val="0"/>
+                </a:spcAft>
+                <a:defRPr sz="2400">
+                  <a:solidFill>
+                    <a:schemeClr val="tx1"/>
+                  </a:solidFill>
+                  <a:latin typeface="Arial" charset="0"/>
+                  <a:ea typeface="ＭＳ Ｐゴシック" charset="0"/>
+                </a:defRPr>
+              </a:lvl7pPr>
+              <a:lvl8pPr marL="3429000" indent="-228600" eaLnBrk="0" fontAlgn="base" hangingPunct="0">
+                <a:spcBef>
+                  <a:spcPct val="0"/>
+                </a:spcBef>
+                <a:spcAft>
+                  <a:spcPct val="0"/>
+                </a:spcAft>
+                <a:defRPr sz="2400">
+                  <a:solidFill>
+                    <a:schemeClr val="tx1"/>
+                  </a:solidFill>
+                  <a:latin typeface="Arial" charset="0"/>
+                  <a:ea typeface="ＭＳ Ｐゴシック" charset="0"/>
+                </a:defRPr>
+              </a:lvl8pPr>
+              <a:lvl9pPr marL="3886200" indent="-228600" eaLnBrk="0" fontAlgn="base" hangingPunct="0">
+                <a:spcBef>
+                  <a:spcPct val="0"/>
+                </a:spcBef>
+                <a:spcAft>
+                  <a:spcPct val="0"/>
+                </a:spcAft>
+                <a:defRPr sz="2400">
+                  <a:solidFill>
+                    <a:schemeClr val="tx1"/>
+                  </a:solidFill>
+                  <a:latin typeface="Arial" charset="0"/>
+                  <a:ea typeface="ＭＳ Ｐゴシック" charset="0"/>
+                </a:defRPr>
+              </a:lvl9pPr>
+            </a:lstStyle>
+            <a:p>
+              <a:pPr algn="ctr" eaLnBrk="1" hangingPunct="1"/>
+              <a:r>
+                <a:rPr lang="en-US" sz="1400" b="1"/>
+                <a:t>Read alignment</a:t>
+              </a:r>
+            </a:p>
+          </p:txBody>
+        </p:sp>
+      </p:grpSp>
+      <p:grpSp>
+        <p:nvGrpSpPr>
+          <p:cNvPr id="12" name="Group 18"/>
+          <p:cNvGrpSpPr>
+            <a:grpSpLocks/>
+          </p:cNvGrpSpPr>
+          <p:nvPr/>
+        </p:nvGrpSpPr>
+        <p:grpSpPr bwMode="auto">
+          <a:xfrm>
+            <a:off x="3668441" y="1796185"/>
+            <a:ext cx="1657350" cy="1393825"/>
+            <a:chOff x="3563889" y="1818692"/>
+            <a:chExt cx="1656184" cy="1394284"/>
+          </a:xfrm>
+        </p:grpSpPr>
+        <p:sp>
+          <p:nvSpPr>
+            <p:cNvPr id="13" name="Rounded Rectangle 12"/>
+            <p:cNvSpPr/>
+            <p:nvPr/>
+          </p:nvSpPr>
+          <p:spPr>
+            <a:xfrm>
+              <a:off x="3708250" y="2493602"/>
+              <a:ext cx="1367462" cy="719374"/>
+            </a:xfrm>
+            <a:prstGeom prst="roundRect">
+              <a:avLst/>
+            </a:prstGeom>
+          </p:spPr>
+          <p:style>
+            <a:lnRef idx="1">
+              <a:schemeClr val="accent1"/>
+            </a:lnRef>
+            <a:fillRef idx="2">
+              <a:schemeClr val="accent1"/>
+            </a:fillRef>
+            <a:effectRef idx="1">
+              <a:schemeClr val="accent1"/>
+            </a:effectRef>
+            <a:fontRef idx="minor">
+              <a:schemeClr val="dk1"/>
+            </a:fontRef>
+          </p:style>
+          <p:txBody>
+            <a:bodyPr anchor="ctr"/>
+            <a:lstStyle/>
+            <a:p>
+              <a:pPr algn="ctr">
+                <a:defRPr/>
+              </a:pPr>
+              <a:r>
+                <a:rPr lang="en-US" sz="1200" dirty="0">
+                  <a:solidFill>
+                    <a:schemeClr val="tx1"/>
+                  </a:solidFill>
+                </a:rPr>
+                <a:t>Cufflinks</a:t>
+              </a:r>
+            </a:p>
+          </p:txBody>
+        </p:sp>
+        <p:sp>
+          <p:nvSpPr>
+            <p:cNvPr id="14" name="TextBox 13"/>
+            <p:cNvSpPr txBox="1">
+              <a:spLocks noChangeArrowheads="1"/>
+            </p:cNvSpPr>
+            <p:nvPr/>
+          </p:nvSpPr>
+          <p:spPr bwMode="auto">
+            <a:xfrm>
+              <a:off x="3563889" y="1818692"/>
+              <a:ext cx="1656184" cy="523220"/>
+            </a:xfrm>
+            <a:prstGeom prst="rect">
+              <a:avLst/>
+            </a:prstGeom>
+            <a:noFill/>
+            <a:ln>
+              <a:noFill/>
+            </a:ln>
+            <a:extLst>
+              <a:ext uri="{909E8E84-426E-40dd-AFC4-6F175D3DCCD1}">
+                <a14:hiddenFill xmlns:a14="http://schemas.microsoft.com/office/drawing/2010/main">
+                  <a:solidFill>
+                    <a:srgbClr val="FFFFFF"/>
+                  </a:solidFill>
+                </a14:hiddenFill>
+              </a:ext>
+              <a:ext uri="{91240B29-F687-4f45-9708-019B960494DF}">
+                <a14:hiddenLine xmlns:a14="http://schemas.microsoft.com/office/drawing/2010/main" w="9525">
+                  <a:solidFill>
+                    <a:srgbClr val="000000"/>
+                  </a:solidFill>
+                  <a:miter lim="800000"/>
+                  <a:headEnd/>
+                  <a:tailEnd/>
+                </a14:hiddenLine>
+              </a:ext>
+            </a:extLst>
+          </p:spPr>
+          <p:txBody>
+            <a:bodyPr>
+              <a:spAutoFit/>
+            </a:bodyPr>
+            <a:lstStyle>
+              <a:lvl1pPr eaLnBrk="0" hangingPunct="0">
+                <a:defRPr sz="2400">
+                  <a:solidFill>
+                    <a:schemeClr val="tx1"/>
+                  </a:solidFill>
+                  <a:latin typeface="Arial" charset="0"/>
+                  <a:ea typeface="ＭＳ Ｐゴシック" charset="0"/>
+                  <a:cs typeface="ＭＳ Ｐゴシック" charset="0"/>
+                </a:defRPr>
+              </a:lvl1pPr>
+              <a:lvl2pPr marL="742950" indent="-285750" eaLnBrk="0" hangingPunct="0">
+                <a:defRPr sz="2400">
+                  <a:solidFill>
+                    <a:schemeClr val="tx1"/>
+                  </a:solidFill>
+                  <a:latin typeface="Arial" charset="0"/>
+                  <a:ea typeface="ＭＳ Ｐゴシック" charset="0"/>
+                </a:defRPr>
+              </a:lvl2pPr>
+              <a:lvl3pPr marL="1143000" indent="-228600" eaLnBrk="0" hangingPunct="0">
+                <a:defRPr sz="2400">
+                  <a:solidFill>
+                    <a:schemeClr val="tx1"/>
+                  </a:solidFill>
+                  <a:latin typeface="Arial" charset="0"/>
+                  <a:ea typeface="ＭＳ Ｐゴシック" charset="0"/>
+                </a:defRPr>
+              </a:lvl3pPr>
+              <a:lvl4pPr marL="1600200" indent="-228600" eaLnBrk="0" hangingPunct="0">
+                <a:defRPr sz="2400">
+                  <a:solidFill>
+                    <a:schemeClr val="tx1"/>
+                  </a:solidFill>
+                  <a:latin typeface="Arial" charset="0"/>
+                  <a:ea typeface="ＭＳ Ｐゴシック" charset="0"/>
+                </a:defRPr>
+              </a:lvl4pPr>
+              <a:lvl5pPr marL="2057400" indent="-228600" eaLnBrk="0" hangingPunct="0">
+                <a:defRPr sz="2400">
+                  <a:solidFill>
+                    <a:schemeClr val="tx1"/>
+                  </a:solidFill>
+                  <a:latin typeface="Arial" charset="0"/>
+                  <a:ea typeface="ＭＳ Ｐゴシック" charset="0"/>
+                </a:defRPr>
+              </a:lvl5pPr>
+              <a:lvl6pPr marL="2514600" indent="-228600" eaLnBrk="0" fontAlgn="base" hangingPunct="0">
+                <a:spcBef>
+                  <a:spcPct val="0"/>
+                </a:spcBef>
+                <a:spcAft>
+                  <a:spcPct val="0"/>
+                </a:spcAft>
+                <a:defRPr sz="2400">
+                  <a:solidFill>
+                    <a:schemeClr val="tx1"/>
+                  </a:solidFill>
+                  <a:latin typeface="Arial" charset="0"/>
+                  <a:ea typeface="ＭＳ Ｐゴシック" charset="0"/>
+                </a:defRPr>
+              </a:lvl6pPr>
+              <a:lvl7pPr marL="2971800" indent="-228600" eaLnBrk="0" fontAlgn="base" hangingPunct="0">
+                <a:spcBef>
+                  <a:spcPct val="0"/>
+                </a:spcBef>
+                <a:spcAft>
+                  <a:spcPct val="0"/>
+                </a:spcAft>
+                <a:defRPr sz="2400">
+                  <a:solidFill>
+                    <a:schemeClr val="tx1"/>
+                  </a:solidFill>
+                  <a:latin typeface="Arial" charset="0"/>
+                  <a:ea typeface="ＭＳ Ｐゴシック" charset="0"/>
+                </a:defRPr>
+              </a:lvl7pPr>
+              <a:lvl8pPr marL="3429000" indent="-228600" eaLnBrk="0" fontAlgn="base" hangingPunct="0">
+                <a:spcBef>
+                  <a:spcPct val="0"/>
+                </a:spcBef>
+                <a:spcAft>
+                  <a:spcPct val="0"/>
+                </a:spcAft>
+                <a:defRPr sz="2400">
+                  <a:solidFill>
+                    <a:schemeClr val="tx1"/>
+                  </a:solidFill>
+                  <a:latin typeface="Arial" charset="0"/>
+                  <a:ea typeface="ＭＳ Ｐゴシック" charset="0"/>
+                </a:defRPr>
+              </a:lvl8pPr>
+              <a:lvl9pPr marL="3886200" indent="-228600" eaLnBrk="0" fontAlgn="base" hangingPunct="0">
+                <a:spcBef>
+                  <a:spcPct val="0"/>
+                </a:spcBef>
+                <a:spcAft>
+                  <a:spcPct val="0"/>
+                </a:spcAft>
+                <a:defRPr sz="2400">
+                  <a:solidFill>
+                    <a:schemeClr val="tx1"/>
+                  </a:solidFill>
+                  <a:latin typeface="Arial" charset="0"/>
+                  <a:ea typeface="ＭＳ Ｐゴシック" charset="0"/>
+                </a:defRPr>
+              </a:lvl9pPr>
+            </a:lstStyle>
+            <a:p>
+              <a:pPr algn="ctr" eaLnBrk="1" hangingPunct="1"/>
+              <a:r>
+                <a:rPr lang="en-US" sz="1400" b="1"/>
+                <a:t>Transcript compilation</a:t>
+              </a:r>
+            </a:p>
+          </p:txBody>
+        </p:sp>
+      </p:grpSp>
+      <p:grpSp>
+        <p:nvGrpSpPr>
+          <p:cNvPr id="15" name="Group 19"/>
+          <p:cNvGrpSpPr>
+            <a:grpSpLocks/>
+          </p:cNvGrpSpPr>
+          <p:nvPr/>
+        </p:nvGrpSpPr>
+        <p:grpSpPr bwMode="auto">
+          <a:xfrm>
+            <a:off x="5325791" y="1796185"/>
+            <a:ext cx="1655763" cy="1393825"/>
+            <a:chOff x="5148064" y="1818692"/>
+            <a:chExt cx="1656184" cy="1394284"/>
+          </a:xfrm>
+        </p:grpSpPr>
+        <p:sp>
+          <p:nvSpPr>
+            <p:cNvPr id="16" name="Rounded Rectangle 15"/>
+            <p:cNvSpPr/>
+            <p:nvPr/>
+          </p:nvSpPr>
+          <p:spPr>
+            <a:xfrm>
+              <a:off x="5292564" y="2493602"/>
+              <a:ext cx="1367185" cy="719374"/>
+            </a:xfrm>
+            <a:prstGeom prst="roundRect">
+              <a:avLst/>
+            </a:prstGeom>
+          </p:spPr>
+          <p:style>
+            <a:lnRef idx="1">
+              <a:schemeClr val="accent1"/>
+            </a:lnRef>
+            <a:fillRef idx="2">
+              <a:schemeClr val="accent1"/>
+            </a:fillRef>
+            <a:effectRef idx="1">
+              <a:schemeClr val="accent1"/>
+            </a:effectRef>
+            <a:fontRef idx="minor">
+              <a:schemeClr val="dk1"/>
+            </a:fontRef>
+          </p:style>
+          <p:txBody>
+            <a:bodyPr anchor="ctr"/>
+            <a:lstStyle/>
+            <a:p>
+              <a:pPr algn="ctr">
+                <a:defRPr/>
+              </a:pPr>
+              <a:r>
+                <a:rPr lang="en-US" sz="1200" dirty="0">
+                  <a:solidFill>
+                    <a:schemeClr val="tx1"/>
+                  </a:solidFill>
+                </a:rPr>
+                <a:t>Cufflinks (</a:t>
+              </a:r>
+              <a:r>
+                <a:rPr lang="en-US" sz="1200" dirty="0" err="1">
+                  <a:solidFill>
+                    <a:schemeClr val="tx1"/>
+                  </a:solidFill>
+                </a:rPr>
+                <a:t>cuffmerge</a:t>
+              </a:r>
+              <a:r>
+                <a:rPr lang="en-US" sz="1200" dirty="0">
+                  <a:solidFill>
+                    <a:schemeClr val="tx1"/>
+                  </a:solidFill>
+                </a:rPr>
+                <a:t>)</a:t>
+              </a:r>
+            </a:p>
+          </p:txBody>
+        </p:sp>
+        <p:sp>
+          <p:nvSpPr>
+            <p:cNvPr id="17" name="TextBox 14"/>
+            <p:cNvSpPr txBox="1">
+              <a:spLocks noChangeArrowheads="1"/>
+            </p:cNvSpPr>
+            <p:nvPr/>
+          </p:nvSpPr>
+          <p:spPr bwMode="auto">
+            <a:xfrm>
+              <a:off x="5148064" y="1818692"/>
+              <a:ext cx="1656184" cy="523220"/>
+            </a:xfrm>
+            <a:prstGeom prst="rect">
+              <a:avLst/>
+            </a:prstGeom>
+            <a:noFill/>
+            <a:ln>
+              <a:noFill/>
+            </a:ln>
+            <a:extLst>
+              <a:ext uri="{909E8E84-426E-40dd-AFC4-6F175D3DCCD1}">
+                <a14:hiddenFill xmlns:a14="http://schemas.microsoft.com/office/drawing/2010/main">
+                  <a:solidFill>
+                    <a:srgbClr val="FFFFFF"/>
+                  </a:solidFill>
+                </a14:hiddenFill>
+              </a:ext>
+              <a:ext uri="{91240B29-F687-4f45-9708-019B960494DF}">
+                <a14:hiddenLine xmlns:a14="http://schemas.microsoft.com/office/drawing/2010/main" w="9525">
+                  <a:solidFill>
+                    <a:srgbClr val="000000"/>
+                  </a:solidFill>
+                  <a:miter lim="800000"/>
+                  <a:headEnd/>
+                  <a:tailEnd/>
+                </a14:hiddenLine>
+              </a:ext>
+            </a:extLst>
+          </p:spPr>
+          <p:txBody>
+            <a:bodyPr>
+              <a:spAutoFit/>
+            </a:bodyPr>
+            <a:lstStyle>
+              <a:lvl1pPr eaLnBrk="0" hangingPunct="0">
+                <a:defRPr sz="2400">
+                  <a:solidFill>
+                    <a:schemeClr val="tx1"/>
+                  </a:solidFill>
+                  <a:latin typeface="Arial" charset="0"/>
+                  <a:ea typeface="ＭＳ Ｐゴシック" charset="0"/>
+                  <a:cs typeface="ＭＳ Ｐゴシック" charset="0"/>
+                </a:defRPr>
+              </a:lvl1pPr>
+              <a:lvl2pPr marL="742950" indent="-285750" eaLnBrk="0" hangingPunct="0">
+                <a:defRPr sz="2400">
+                  <a:solidFill>
+                    <a:schemeClr val="tx1"/>
+                  </a:solidFill>
+                  <a:latin typeface="Arial" charset="0"/>
+                  <a:ea typeface="ＭＳ Ｐゴシック" charset="0"/>
+                </a:defRPr>
+              </a:lvl2pPr>
+              <a:lvl3pPr marL="1143000" indent="-228600" eaLnBrk="0" hangingPunct="0">
+                <a:defRPr sz="2400">
+                  <a:solidFill>
+                    <a:schemeClr val="tx1"/>
+                  </a:solidFill>
+                  <a:latin typeface="Arial" charset="0"/>
+                  <a:ea typeface="ＭＳ Ｐゴシック" charset="0"/>
+                </a:defRPr>
+              </a:lvl3pPr>
+              <a:lvl4pPr marL="1600200" indent="-228600" eaLnBrk="0" hangingPunct="0">
+                <a:defRPr sz="2400">
+                  <a:solidFill>
+                    <a:schemeClr val="tx1"/>
+                  </a:solidFill>
+                  <a:latin typeface="Arial" charset="0"/>
+                  <a:ea typeface="ＭＳ Ｐゴシック" charset="0"/>
+                </a:defRPr>
+              </a:lvl4pPr>
+              <a:lvl5pPr marL="2057400" indent="-228600" eaLnBrk="0" hangingPunct="0">
+                <a:defRPr sz="2400">
+                  <a:solidFill>
+                    <a:schemeClr val="tx1"/>
+                  </a:solidFill>
+                  <a:latin typeface="Arial" charset="0"/>
+                  <a:ea typeface="ＭＳ Ｐゴシック" charset="0"/>
+                </a:defRPr>
+              </a:lvl5pPr>
+              <a:lvl6pPr marL="2514600" indent="-228600" eaLnBrk="0" fontAlgn="base" hangingPunct="0">
+                <a:spcBef>
+                  <a:spcPct val="0"/>
+                </a:spcBef>
+                <a:spcAft>
+                  <a:spcPct val="0"/>
+                </a:spcAft>
+                <a:defRPr sz="2400">
+                  <a:solidFill>
+                    <a:schemeClr val="tx1"/>
+                  </a:solidFill>
+                  <a:latin typeface="Arial" charset="0"/>
+                  <a:ea typeface="ＭＳ Ｐゴシック" charset="0"/>
+                </a:defRPr>
+              </a:lvl6pPr>
+              <a:lvl7pPr marL="2971800" indent="-228600" eaLnBrk="0" fontAlgn="base" hangingPunct="0">
+                <a:spcBef>
+                  <a:spcPct val="0"/>
+                </a:spcBef>
+                <a:spcAft>
+                  <a:spcPct val="0"/>
+                </a:spcAft>
+                <a:defRPr sz="2400">
+                  <a:solidFill>
+                    <a:schemeClr val="tx1"/>
+                  </a:solidFill>
+                  <a:latin typeface="Arial" charset="0"/>
+                  <a:ea typeface="ＭＳ Ｐゴシック" charset="0"/>
+                </a:defRPr>
+              </a:lvl7pPr>
+              <a:lvl8pPr marL="3429000" indent="-228600" eaLnBrk="0" fontAlgn="base" hangingPunct="0">
+                <a:spcBef>
+                  <a:spcPct val="0"/>
+                </a:spcBef>
+                <a:spcAft>
+                  <a:spcPct val="0"/>
+                </a:spcAft>
+                <a:defRPr sz="2400">
+                  <a:solidFill>
+                    <a:schemeClr val="tx1"/>
+                  </a:solidFill>
+                  <a:latin typeface="Arial" charset="0"/>
+                  <a:ea typeface="ＭＳ Ｐゴシック" charset="0"/>
+                </a:defRPr>
+              </a:lvl8pPr>
+              <a:lvl9pPr marL="3886200" indent="-228600" eaLnBrk="0" fontAlgn="base" hangingPunct="0">
+                <a:spcBef>
+                  <a:spcPct val="0"/>
+                </a:spcBef>
+                <a:spcAft>
+                  <a:spcPct val="0"/>
+                </a:spcAft>
+                <a:defRPr sz="2400">
+                  <a:solidFill>
+                    <a:schemeClr val="tx1"/>
+                  </a:solidFill>
+                  <a:latin typeface="Arial" charset="0"/>
+                  <a:ea typeface="ＭＳ Ｐゴシック" charset="0"/>
+                </a:defRPr>
+              </a:lvl9pPr>
+            </a:lstStyle>
+            <a:p>
+              <a:pPr algn="ctr" eaLnBrk="1" hangingPunct="1"/>
+              <a:r>
+                <a:rPr lang="en-US" sz="1400" b="1"/>
+                <a:t>Gene identification</a:t>
+              </a:r>
+            </a:p>
+          </p:txBody>
+        </p:sp>
+      </p:grpSp>
+      <p:grpSp>
+        <p:nvGrpSpPr>
+          <p:cNvPr id="18" name="Group 20"/>
+          <p:cNvGrpSpPr>
+            <a:grpSpLocks/>
+          </p:cNvGrpSpPr>
+          <p:nvPr/>
+        </p:nvGrpSpPr>
+        <p:grpSpPr bwMode="auto">
+          <a:xfrm>
+            <a:off x="7052991" y="1796185"/>
+            <a:ext cx="1655763" cy="1393825"/>
+            <a:chOff x="6804248" y="1818692"/>
+            <a:chExt cx="1656184" cy="1394284"/>
+          </a:xfrm>
+        </p:grpSpPr>
+        <p:sp>
+          <p:nvSpPr>
+            <p:cNvPr id="19" name="Rounded Rectangle 18"/>
+            <p:cNvSpPr/>
+            <p:nvPr/>
+          </p:nvSpPr>
+          <p:spPr>
+            <a:xfrm>
+              <a:off x="6912225" y="2493602"/>
+              <a:ext cx="1440229" cy="719374"/>
+            </a:xfrm>
+            <a:prstGeom prst="roundRect">
+              <a:avLst/>
+            </a:prstGeom>
+          </p:spPr>
+          <p:style>
+            <a:lnRef idx="1">
+              <a:schemeClr val="accent1"/>
+            </a:lnRef>
+            <a:fillRef idx="2">
+              <a:schemeClr val="accent1"/>
+            </a:fillRef>
+            <a:effectRef idx="1">
+              <a:schemeClr val="accent1"/>
+            </a:effectRef>
+            <a:fontRef idx="minor">
+              <a:schemeClr val="dk1"/>
+            </a:fontRef>
+          </p:style>
+          <p:txBody>
+            <a:bodyPr anchor="ctr"/>
+            <a:lstStyle/>
+            <a:p>
+              <a:pPr algn="ctr">
+                <a:defRPr/>
+              </a:pPr>
+              <a:r>
+                <a:rPr lang="en-US" sz="1200" dirty="0" err="1">
+                  <a:solidFill>
+                    <a:schemeClr val="tx1"/>
+                  </a:solidFill>
+                </a:rPr>
+                <a:t>Cuffdiff</a:t>
+              </a:r>
+              <a:endParaRPr lang="en-US" sz="1200" dirty="0">
+                <a:solidFill>
+                  <a:schemeClr val="tx1"/>
+                </a:solidFill>
+              </a:endParaRPr>
+            </a:p>
+            <a:p>
+              <a:pPr algn="ctr">
+                <a:defRPr/>
+              </a:pPr>
+              <a:r>
+                <a:rPr lang="en-US" sz="1200" dirty="0">
+                  <a:solidFill>
+                    <a:schemeClr val="tx1"/>
+                  </a:solidFill>
+                </a:rPr>
+                <a:t>(A:B comparison)</a:t>
+              </a:r>
+            </a:p>
+          </p:txBody>
+        </p:sp>
+        <p:sp>
+          <p:nvSpPr>
+            <p:cNvPr id="20" name="TextBox 15"/>
+            <p:cNvSpPr txBox="1">
+              <a:spLocks noChangeArrowheads="1"/>
+            </p:cNvSpPr>
+            <p:nvPr/>
+          </p:nvSpPr>
+          <p:spPr bwMode="auto">
+            <a:xfrm>
+              <a:off x="6804248" y="1818692"/>
+              <a:ext cx="1656184" cy="523392"/>
+            </a:xfrm>
+            <a:prstGeom prst="rect">
+              <a:avLst/>
+            </a:prstGeom>
+            <a:noFill/>
+            <a:ln>
+              <a:noFill/>
+            </a:ln>
+            <a:extLst>
+              <a:ext uri="{909E8E84-426E-40dd-AFC4-6F175D3DCCD1}">
+                <a14:hiddenFill xmlns:a14="http://schemas.microsoft.com/office/drawing/2010/main">
+                  <a:solidFill>
+                    <a:srgbClr val="FFFFFF"/>
+                  </a:solidFill>
+                </a14:hiddenFill>
+              </a:ext>
+              <a:ext uri="{91240B29-F687-4f45-9708-019B960494DF}">
+                <a14:hiddenLine xmlns:a14="http://schemas.microsoft.com/office/drawing/2010/main" w="9525">
+                  <a:solidFill>
+                    <a:srgbClr val="000000"/>
+                  </a:solidFill>
+                  <a:miter lim="800000"/>
+                  <a:headEnd/>
+                  <a:tailEnd/>
+                </a14:hiddenLine>
+              </a:ext>
+            </a:extLst>
+          </p:spPr>
+          <p:txBody>
+            <a:bodyPr>
+              <a:spAutoFit/>
+            </a:bodyPr>
+            <a:lstStyle>
+              <a:lvl1pPr eaLnBrk="0" hangingPunct="0">
+                <a:defRPr sz="2400">
+                  <a:solidFill>
+                    <a:schemeClr val="tx1"/>
+                  </a:solidFill>
+                  <a:latin typeface="Arial" charset="0"/>
+                  <a:ea typeface="ＭＳ Ｐゴシック" charset="0"/>
+                  <a:cs typeface="ＭＳ Ｐゴシック" charset="0"/>
+                </a:defRPr>
+              </a:lvl1pPr>
+              <a:lvl2pPr marL="742950" indent="-285750" eaLnBrk="0" hangingPunct="0">
+                <a:defRPr sz="2400">
+                  <a:solidFill>
+                    <a:schemeClr val="tx1"/>
+                  </a:solidFill>
+                  <a:latin typeface="Arial" charset="0"/>
+                  <a:ea typeface="ＭＳ Ｐゴシック" charset="0"/>
+                </a:defRPr>
+              </a:lvl2pPr>
+              <a:lvl3pPr marL="1143000" indent="-228600" eaLnBrk="0" hangingPunct="0">
+                <a:defRPr sz="2400">
+                  <a:solidFill>
+                    <a:schemeClr val="tx1"/>
+                  </a:solidFill>
+                  <a:latin typeface="Arial" charset="0"/>
+                  <a:ea typeface="ＭＳ Ｐゴシック" charset="0"/>
+                </a:defRPr>
+              </a:lvl3pPr>
+              <a:lvl4pPr marL="1600200" indent="-228600" eaLnBrk="0" hangingPunct="0">
+                <a:defRPr sz="2400">
+                  <a:solidFill>
+                    <a:schemeClr val="tx1"/>
+                  </a:solidFill>
+                  <a:latin typeface="Arial" charset="0"/>
+                  <a:ea typeface="ＭＳ Ｐゴシック" charset="0"/>
+                </a:defRPr>
+              </a:lvl4pPr>
+              <a:lvl5pPr marL="2057400" indent="-228600" eaLnBrk="0" hangingPunct="0">
+                <a:defRPr sz="2400">
+                  <a:solidFill>
+                    <a:schemeClr val="tx1"/>
+                  </a:solidFill>
+                  <a:latin typeface="Arial" charset="0"/>
+                  <a:ea typeface="ＭＳ Ｐゴシック" charset="0"/>
+                </a:defRPr>
+              </a:lvl5pPr>
+              <a:lvl6pPr marL="2514600" indent="-228600" eaLnBrk="0" fontAlgn="base" hangingPunct="0">
+                <a:spcBef>
+                  <a:spcPct val="0"/>
+                </a:spcBef>
+                <a:spcAft>
+                  <a:spcPct val="0"/>
+                </a:spcAft>
+                <a:defRPr sz="2400">
+                  <a:solidFill>
+                    <a:schemeClr val="tx1"/>
+                  </a:solidFill>
+                  <a:latin typeface="Arial" charset="0"/>
+                  <a:ea typeface="ＭＳ Ｐゴシック" charset="0"/>
+                </a:defRPr>
+              </a:lvl6pPr>
+              <a:lvl7pPr marL="2971800" indent="-228600" eaLnBrk="0" fontAlgn="base" hangingPunct="0">
+                <a:spcBef>
+                  <a:spcPct val="0"/>
+                </a:spcBef>
+                <a:spcAft>
+                  <a:spcPct val="0"/>
+                </a:spcAft>
+                <a:defRPr sz="2400">
+                  <a:solidFill>
+                    <a:schemeClr val="tx1"/>
+                  </a:solidFill>
+                  <a:latin typeface="Arial" charset="0"/>
+                  <a:ea typeface="ＭＳ Ｐゴシック" charset="0"/>
+                </a:defRPr>
+              </a:lvl7pPr>
+              <a:lvl8pPr marL="3429000" indent="-228600" eaLnBrk="0" fontAlgn="base" hangingPunct="0">
+                <a:spcBef>
+                  <a:spcPct val="0"/>
+                </a:spcBef>
+                <a:spcAft>
+                  <a:spcPct val="0"/>
+                </a:spcAft>
+                <a:defRPr sz="2400">
+                  <a:solidFill>
+                    <a:schemeClr val="tx1"/>
+                  </a:solidFill>
+                  <a:latin typeface="Arial" charset="0"/>
+                  <a:ea typeface="ＭＳ Ｐゴシック" charset="0"/>
+                </a:defRPr>
+              </a:lvl8pPr>
+              <a:lvl9pPr marL="3886200" indent="-228600" eaLnBrk="0" fontAlgn="base" hangingPunct="0">
+                <a:spcBef>
+                  <a:spcPct val="0"/>
+                </a:spcBef>
+                <a:spcAft>
+                  <a:spcPct val="0"/>
+                </a:spcAft>
+                <a:defRPr sz="2400">
+                  <a:solidFill>
+                    <a:schemeClr val="tx1"/>
+                  </a:solidFill>
+                  <a:latin typeface="Arial" charset="0"/>
+                  <a:ea typeface="ＭＳ Ｐゴシック" charset="0"/>
+                </a:defRPr>
+              </a:lvl9pPr>
+            </a:lstStyle>
+            <a:p>
+              <a:pPr algn="ctr" eaLnBrk="1" hangingPunct="1"/>
+              <a:r>
+                <a:rPr lang="en-US" sz="1400" b="1"/>
+                <a:t>Differential expression</a:t>
+              </a:r>
+            </a:p>
+          </p:txBody>
+        </p:sp>
+      </p:grpSp>
+      <p:grpSp>
+        <p:nvGrpSpPr>
+          <p:cNvPr id="21" name="Group 21"/>
+          <p:cNvGrpSpPr>
+            <a:grpSpLocks/>
+          </p:cNvGrpSpPr>
+          <p:nvPr/>
+        </p:nvGrpSpPr>
+        <p:grpSpPr bwMode="auto">
+          <a:xfrm>
+            <a:off x="7052991" y="3766273"/>
+            <a:ext cx="1655763" cy="1171575"/>
+            <a:chOff x="6804248" y="3861048"/>
+            <a:chExt cx="1656184" cy="1171873"/>
+          </a:xfrm>
+        </p:grpSpPr>
+        <p:sp>
+          <p:nvSpPr>
+            <p:cNvPr id="22" name="Rounded Rectangle 21"/>
+            <p:cNvSpPr/>
+            <p:nvPr/>
+          </p:nvSpPr>
+          <p:spPr>
+            <a:xfrm>
+              <a:off x="6948748" y="3861048"/>
+              <a:ext cx="1367185" cy="719320"/>
+            </a:xfrm>
+            <a:prstGeom prst="roundRect">
+              <a:avLst/>
+            </a:prstGeom>
+          </p:spPr>
+          <p:style>
+            <a:lnRef idx="1">
+              <a:schemeClr val="accent2"/>
+            </a:lnRef>
+            <a:fillRef idx="2">
+              <a:schemeClr val="accent2"/>
+            </a:fillRef>
+            <a:effectRef idx="1">
+              <a:schemeClr val="accent2"/>
+            </a:effectRef>
+            <a:fontRef idx="minor">
+              <a:schemeClr val="dk1"/>
+            </a:fontRef>
+          </p:style>
+          <p:txBody>
+            <a:bodyPr anchor="ctr"/>
+            <a:lstStyle/>
+            <a:p>
+              <a:pPr algn="ctr">
+                <a:defRPr/>
+              </a:pPr>
+              <a:r>
+                <a:rPr lang="en-US" sz="1200" dirty="0" err="1">
+                  <a:solidFill>
+                    <a:schemeClr val="tx1"/>
+                  </a:solidFill>
+                </a:rPr>
+                <a:t>CummRbund</a:t>
+              </a:r>
+              <a:endParaRPr lang="en-US" sz="1200" dirty="0">
+                <a:solidFill>
+                  <a:schemeClr val="tx1"/>
+                </a:solidFill>
+              </a:endParaRPr>
+            </a:p>
+          </p:txBody>
+        </p:sp>
+        <p:sp>
+          <p:nvSpPr>
+            <p:cNvPr id="23" name="TextBox 17"/>
+            <p:cNvSpPr txBox="1">
+              <a:spLocks noChangeArrowheads="1"/>
+            </p:cNvSpPr>
+            <p:nvPr/>
+          </p:nvSpPr>
+          <p:spPr bwMode="auto">
+            <a:xfrm>
+              <a:off x="6804248" y="4725144"/>
+              <a:ext cx="1656184" cy="307777"/>
+            </a:xfrm>
+            <a:prstGeom prst="rect">
+              <a:avLst/>
+            </a:prstGeom>
+            <a:noFill/>
+            <a:ln>
+              <a:noFill/>
+            </a:ln>
+            <a:extLst>
+              <a:ext uri="{909E8E84-426E-40dd-AFC4-6F175D3DCCD1}">
+                <a14:hiddenFill xmlns:a14="http://schemas.microsoft.com/office/drawing/2010/main">
+                  <a:solidFill>
+                    <a:srgbClr val="FFFFFF"/>
+                  </a:solidFill>
+                </a14:hiddenFill>
+              </a:ext>
+              <a:ext uri="{91240B29-F687-4f45-9708-019B960494DF}">
+                <a14:hiddenLine xmlns:a14="http://schemas.microsoft.com/office/drawing/2010/main" w="9525">
+                  <a:solidFill>
+                    <a:srgbClr val="000000"/>
+                  </a:solidFill>
+                  <a:miter lim="800000"/>
+                  <a:headEnd/>
+                  <a:tailEnd/>
+                </a14:hiddenLine>
+              </a:ext>
+            </a:extLst>
+          </p:spPr>
+          <p:txBody>
+            <a:bodyPr>
+              <a:spAutoFit/>
+            </a:bodyPr>
+            <a:lstStyle>
+              <a:lvl1pPr eaLnBrk="0" hangingPunct="0">
+                <a:defRPr sz="2400">
+                  <a:solidFill>
+                    <a:schemeClr val="tx1"/>
+                  </a:solidFill>
+                  <a:latin typeface="Arial" charset="0"/>
+                  <a:ea typeface="ＭＳ Ｐゴシック" charset="0"/>
+                  <a:cs typeface="ＭＳ Ｐゴシック" charset="0"/>
+                </a:defRPr>
+              </a:lvl1pPr>
+              <a:lvl2pPr marL="742950" indent="-285750" eaLnBrk="0" hangingPunct="0">
+                <a:defRPr sz="2400">
+                  <a:solidFill>
+                    <a:schemeClr val="tx1"/>
+                  </a:solidFill>
+                  <a:latin typeface="Arial" charset="0"/>
+                  <a:ea typeface="ＭＳ Ｐゴシック" charset="0"/>
+                </a:defRPr>
+              </a:lvl2pPr>
+              <a:lvl3pPr marL="1143000" indent="-228600" eaLnBrk="0" hangingPunct="0">
+                <a:defRPr sz="2400">
+                  <a:solidFill>
+                    <a:schemeClr val="tx1"/>
+                  </a:solidFill>
+                  <a:latin typeface="Arial" charset="0"/>
+                  <a:ea typeface="ＭＳ Ｐゴシック" charset="0"/>
+                </a:defRPr>
+              </a:lvl3pPr>
+              <a:lvl4pPr marL="1600200" indent="-228600" eaLnBrk="0" hangingPunct="0">
+                <a:defRPr sz="2400">
+                  <a:solidFill>
+                    <a:schemeClr val="tx1"/>
+                  </a:solidFill>
+                  <a:latin typeface="Arial" charset="0"/>
+                  <a:ea typeface="ＭＳ Ｐゴシック" charset="0"/>
+                </a:defRPr>
+              </a:lvl4pPr>
+              <a:lvl5pPr marL="2057400" indent="-228600" eaLnBrk="0" hangingPunct="0">
+                <a:defRPr sz="2400">
+                  <a:solidFill>
+                    <a:schemeClr val="tx1"/>
+                  </a:solidFill>
+                  <a:latin typeface="Arial" charset="0"/>
+                  <a:ea typeface="ＭＳ Ｐゴシック" charset="0"/>
+                </a:defRPr>
+              </a:lvl5pPr>
+              <a:lvl6pPr marL="2514600" indent="-228600" eaLnBrk="0" fontAlgn="base" hangingPunct="0">
+                <a:spcBef>
+                  <a:spcPct val="0"/>
+                </a:spcBef>
+                <a:spcAft>
+                  <a:spcPct val="0"/>
+                </a:spcAft>
+                <a:defRPr sz="2400">
+                  <a:solidFill>
+                    <a:schemeClr val="tx1"/>
+                  </a:solidFill>
+                  <a:latin typeface="Arial" charset="0"/>
+                  <a:ea typeface="ＭＳ Ｐゴシック" charset="0"/>
+                </a:defRPr>
+              </a:lvl6pPr>
+              <a:lvl7pPr marL="2971800" indent="-228600" eaLnBrk="0" fontAlgn="base" hangingPunct="0">
+                <a:spcBef>
+                  <a:spcPct val="0"/>
+                </a:spcBef>
+                <a:spcAft>
+                  <a:spcPct val="0"/>
+                </a:spcAft>
+                <a:defRPr sz="2400">
+                  <a:solidFill>
+                    <a:schemeClr val="tx1"/>
+                  </a:solidFill>
+                  <a:latin typeface="Arial" charset="0"/>
+                  <a:ea typeface="ＭＳ Ｐゴシック" charset="0"/>
+                </a:defRPr>
+              </a:lvl7pPr>
+              <a:lvl8pPr marL="3429000" indent="-228600" eaLnBrk="0" fontAlgn="base" hangingPunct="0">
+                <a:spcBef>
+                  <a:spcPct val="0"/>
+                </a:spcBef>
+                <a:spcAft>
+                  <a:spcPct val="0"/>
+                </a:spcAft>
+                <a:defRPr sz="2400">
+                  <a:solidFill>
+                    <a:schemeClr val="tx1"/>
+                  </a:solidFill>
+                  <a:latin typeface="Arial" charset="0"/>
+                  <a:ea typeface="ＭＳ Ｐゴシック" charset="0"/>
+                </a:defRPr>
+              </a:lvl8pPr>
+              <a:lvl9pPr marL="3886200" indent="-228600" eaLnBrk="0" fontAlgn="base" hangingPunct="0">
+                <a:spcBef>
+                  <a:spcPct val="0"/>
+                </a:spcBef>
+                <a:spcAft>
+                  <a:spcPct val="0"/>
+                </a:spcAft>
+                <a:defRPr sz="2400">
+                  <a:solidFill>
+                    <a:schemeClr val="tx1"/>
+                  </a:solidFill>
+                  <a:latin typeface="Arial" charset="0"/>
+                  <a:ea typeface="ＭＳ Ｐゴシック" charset="0"/>
+                </a:defRPr>
+              </a:lvl9pPr>
+            </a:lstStyle>
+            <a:p>
+              <a:pPr algn="ctr" eaLnBrk="1" hangingPunct="1"/>
+              <a:r>
+                <a:rPr lang="en-US" sz="1400" b="1"/>
+                <a:t>Visualization</a:t>
+              </a:r>
+            </a:p>
+          </p:txBody>
+        </p:sp>
+      </p:grpSp>
+      <p:cxnSp>
+        <p:nvCxnSpPr>
+          <p:cNvPr id="24" name="Straight Arrow Connector 23"/>
+          <p:cNvCxnSpPr>
+            <a:stCxn id="7" idx="3"/>
+            <a:endCxn id="10" idx="1"/>
+          </p:cNvCxnSpPr>
+          <p:nvPr/>
+        </p:nvCxnSpPr>
+        <p:spPr>
+          <a:xfrm>
+            <a:off x="1868216" y="2829648"/>
+            <a:ext cx="296863" cy="0"/>
+          </a:xfrm>
+          <a:prstGeom prst="straightConnector1">
+            <a:avLst/>
+          </a:prstGeom>
+          <a:ln>
+            <a:tailEnd type="arrow"/>
+          </a:ln>
+        </p:spPr>
+        <p:style>
+          <a:lnRef idx="2">
+            <a:schemeClr val="dk1"/>
+          </a:lnRef>
+          <a:fillRef idx="0">
+            <a:schemeClr val="dk1"/>
+          </a:fillRef>
+          <a:effectRef idx="1">
+            <a:schemeClr val="dk1"/>
+          </a:effectRef>
+          <a:fontRef idx="minor">
+            <a:schemeClr val="tx1"/>
+          </a:fontRef>
+        </p:style>
+      </p:cxnSp>
+      <p:cxnSp>
+        <p:nvCxnSpPr>
+          <p:cNvPr id="25" name="Straight Arrow Connector 24"/>
+          <p:cNvCxnSpPr>
+            <a:stCxn id="10" idx="3"/>
+            <a:endCxn id="13" idx="1"/>
+          </p:cNvCxnSpPr>
+          <p:nvPr/>
+        </p:nvCxnSpPr>
+        <p:spPr>
+          <a:xfrm>
+            <a:off x="3533504" y="2829648"/>
+            <a:ext cx="279400" cy="0"/>
+          </a:xfrm>
+          <a:prstGeom prst="straightConnector1">
+            <a:avLst/>
+          </a:prstGeom>
+          <a:ln>
+            <a:tailEnd type="arrow"/>
+          </a:ln>
+        </p:spPr>
+        <p:style>
+          <a:lnRef idx="2">
+            <a:schemeClr val="dk1"/>
+          </a:lnRef>
+          <a:fillRef idx="0">
+            <a:schemeClr val="dk1"/>
+          </a:fillRef>
+          <a:effectRef idx="1">
+            <a:schemeClr val="dk1"/>
+          </a:effectRef>
+          <a:fontRef idx="minor">
+            <a:schemeClr val="tx1"/>
+          </a:fontRef>
+        </p:style>
+      </p:cxnSp>
+      <p:cxnSp>
+        <p:nvCxnSpPr>
+          <p:cNvPr id="26" name="Straight Arrow Connector 25"/>
+          <p:cNvCxnSpPr>
+            <a:stCxn id="13" idx="3"/>
+            <a:endCxn id="16" idx="1"/>
+          </p:cNvCxnSpPr>
+          <p:nvPr/>
+        </p:nvCxnSpPr>
+        <p:spPr>
+          <a:xfrm>
+            <a:off x="5181329" y="2829648"/>
+            <a:ext cx="287337" cy="0"/>
+          </a:xfrm>
+          <a:prstGeom prst="straightConnector1">
+            <a:avLst/>
+          </a:prstGeom>
+          <a:ln>
+            <a:tailEnd type="arrow"/>
+          </a:ln>
+        </p:spPr>
+        <p:style>
+          <a:lnRef idx="2">
+            <a:schemeClr val="dk1"/>
+          </a:lnRef>
+          <a:fillRef idx="0">
+            <a:schemeClr val="dk1"/>
+          </a:fillRef>
+          <a:effectRef idx="1">
+            <a:schemeClr val="dk1"/>
+          </a:effectRef>
+          <a:fontRef idx="minor">
+            <a:schemeClr val="tx1"/>
+          </a:fontRef>
+        </p:style>
+      </p:cxnSp>
+      <p:cxnSp>
+        <p:nvCxnSpPr>
+          <p:cNvPr id="27" name="Straight Arrow Connector 26"/>
+          <p:cNvCxnSpPr>
+            <a:stCxn id="16" idx="3"/>
+            <a:endCxn id="19" idx="1"/>
+          </p:cNvCxnSpPr>
+          <p:nvPr/>
+        </p:nvCxnSpPr>
+        <p:spPr>
+          <a:xfrm>
+            <a:off x="6837091" y="2829648"/>
+            <a:ext cx="323850" cy="0"/>
+          </a:xfrm>
+          <a:prstGeom prst="straightConnector1">
+            <a:avLst/>
+          </a:prstGeom>
+          <a:ln>
+            <a:tailEnd type="arrow"/>
+          </a:ln>
+        </p:spPr>
+        <p:style>
+          <a:lnRef idx="2">
+            <a:schemeClr val="dk1"/>
+          </a:lnRef>
+          <a:fillRef idx="0">
+            <a:schemeClr val="dk1"/>
+          </a:fillRef>
+          <a:effectRef idx="1">
+            <a:schemeClr val="dk1"/>
+          </a:effectRef>
+          <a:fontRef idx="minor">
+            <a:schemeClr val="tx1"/>
+          </a:fontRef>
+        </p:style>
+      </p:cxnSp>
+      <p:cxnSp>
+        <p:nvCxnSpPr>
+          <p:cNvPr id="28" name="Straight Arrow Connector 27"/>
+          <p:cNvCxnSpPr>
+            <a:stCxn id="19" idx="2"/>
+            <a:endCxn id="22" idx="0"/>
+          </p:cNvCxnSpPr>
+          <p:nvPr/>
+        </p:nvCxnSpPr>
+        <p:spPr>
+          <a:xfrm>
+            <a:off x="7881666" y="3190010"/>
+            <a:ext cx="0" cy="576263"/>
+          </a:xfrm>
+          <a:prstGeom prst="straightConnector1">
+            <a:avLst/>
+          </a:prstGeom>
+          <a:ln>
+            <a:tailEnd type="arrow"/>
+          </a:ln>
+        </p:spPr>
+        <p:style>
+          <a:lnRef idx="2">
+            <a:schemeClr val="dk1"/>
+          </a:lnRef>
+          <a:fillRef idx="0">
+            <a:schemeClr val="dk1"/>
+          </a:fillRef>
+          <a:effectRef idx="1">
+            <a:schemeClr val="dk1"/>
+          </a:effectRef>
+          <a:fontRef idx="minor">
+            <a:schemeClr val="tx1"/>
+          </a:fontRef>
+        </p:style>
+      </p:cxnSp>
+      <p:sp>
+        <p:nvSpPr>
+          <p:cNvPr id="29" name="Rounded Rectangle 28"/>
+          <p:cNvSpPr/>
+          <p:nvPr/>
+        </p:nvSpPr>
+        <p:spPr bwMode="auto">
+          <a:xfrm>
+            <a:off x="3812904" y="3766273"/>
+            <a:ext cx="1368425" cy="719137"/>
+          </a:xfrm>
+          <a:prstGeom prst="roundRect">
+            <a:avLst/>
+          </a:prstGeom>
+        </p:spPr>
+        <p:style>
+          <a:lnRef idx="1">
+            <a:schemeClr val="dk1"/>
+          </a:lnRef>
+          <a:fillRef idx="2">
+            <a:schemeClr val="dk1"/>
+          </a:fillRef>
+          <a:effectRef idx="1">
+            <a:schemeClr val="dk1"/>
+          </a:effectRef>
+          <a:fontRef idx="minor">
+            <a:schemeClr val="dk1"/>
+          </a:fontRef>
+        </p:style>
+        <p:txBody>
+          <a:bodyPr anchor="ctr"/>
+          <a:lstStyle/>
+          <a:p>
+            <a:pPr algn="ctr">
+              <a:defRPr/>
+            </a:pPr>
+            <a:r>
+              <a:rPr lang="en-US" sz="1200" dirty="0">
+                <a:solidFill>
+                  <a:schemeClr val="tx1"/>
+                </a:solidFill>
+              </a:rPr>
+              <a:t>Gene annotation </a:t>
+            </a:r>
+          </a:p>
+          <a:p>
+            <a:pPr algn="ctr">
+              <a:defRPr/>
+            </a:pPr>
+            <a:r>
+              <a:rPr lang="en-US" sz="1200" dirty="0">
+                <a:solidFill>
+                  <a:schemeClr val="tx1"/>
+                </a:solidFill>
+              </a:rPr>
+              <a:t>(.</a:t>
+            </a:r>
+            <a:r>
+              <a:rPr lang="en-US" sz="1200" dirty="0" err="1">
+                <a:solidFill>
+                  <a:schemeClr val="tx1"/>
+                </a:solidFill>
+              </a:rPr>
+              <a:t>gtf</a:t>
+            </a:r>
+            <a:r>
+              <a:rPr lang="en-US" sz="1200" dirty="0">
+                <a:solidFill>
+                  <a:schemeClr val="tx1"/>
+                </a:solidFill>
+              </a:rPr>
+              <a:t> file)</a:t>
+            </a:r>
+          </a:p>
+        </p:txBody>
+      </p:sp>
+      <p:sp>
+        <p:nvSpPr>
+          <p:cNvPr id="30" name="Rounded Rectangle 29"/>
+          <p:cNvSpPr/>
+          <p:nvPr/>
+        </p:nvSpPr>
+        <p:spPr bwMode="auto">
+          <a:xfrm>
+            <a:off x="2157141" y="3766273"/>
+            <a:ext cx="1368425" cy="719137"/>
+          </a:xfrm>
+          <a:prstGeom prst="roundRect">
+            <a:avLst/>
+          </a:prstGeom>
+        </p:spPr>
+        <p:style>
+          <a:lnRef idx="1">
+            <a:schemeClr val="dk1"/>
+          </a:lnRef>
+          <a:fillRef idx="2">
+            <a:schemeClr val="dk1"/>
+          </a:fillRef>
+          <a:effectRef idx="1">
+            <a:schemeClr val="dk1"/>
+          </a:effectRef>
+          <a:fontRef idx="minor">
+            <a:schemeClr val="dk1"/>
+          </a:fontRef>
+        </p:style>
+        <p:txBody>
+          <a:bodyPr anchor="ctr"/>
+          <a:lstStyle/>
+          <a:p>
+            <a:pPr algn="ctr">
+              <a:defRPr/>
+            </a:pPr>
+            <a:r>
+              <a:rPr lang="en-US" sz="1200" dirty="0">
+                <a:solidFill>
+                  <a:schemeClr val="tx1"/>
+                </a:solidFill>
+              </a:rPr>
+              <a:t>Reference genome</a:t>
+            </a:r>
+          </a:p>
+          <a:p>
+            <a:pPr algn="ctr">
+              <a:defRPr/>
+            </a:pPr>
+            <a:r>
+              <a:rPr lang="en-US" sz="1200" dirty="0">
+                <a:solidFill>
+                  <a:schemeClr val="tx1"/>
+                </a:solidFill>
+              </a:rPr>
+              <a:t>(.</a:t>
+            </a:r>
+            <a:r>
+              <a:rPr lang="en-US" sz="1200" dirty="0" err="1">
+                <a:solidFill>
+                  <a:schemeClr val="tx1"/>
+                </a:solidFill>
+              </a:rPr>
+              <a:t>fa</a:t>
+            </a:r>
+            <a:r>
+              <a:rPr lang="en-US" sz="1200" dirty="0">
+                <a:solidFill>
+                  <a:schemeClr val="tx1"/>
+                </a:solidFill>
+              </a:rPr>
+              <a:t> file)</a:t>
+            </a:r>
+          </a:p>
+        </p:txBody>
+      </p:sp>
+      <p:sp>
+        <p:nvSpPr>
+          <p:cNvPr id="31" name="Rounded Rectangle 30"/>
+          <p:cNvSpPr/>
+          <p:nvPr/>
+        </p:nvSpPr>
+        <p:spPr bwMode="auto">
+          <a:xfrm>
+            <a:off x="499791" y="3766273"/>
+            <a:ext cx="1368425" cy="719137"/>
+          </a:xfrm>
+          <a:prstGeom prst="roundRect">
+            <a:avLst/>
+          </a:prstGeom>
+        </p:spPr>
+        <p:style>
+          <a:lnRef idx="1">
+            <a:schemeClr val="dk1"/>
+          </a:lnRef>
+          <a:fillRef idx="2">
+            <a:schemeClr val="dk1"/>
+          </a:fillRef>
+          <a:effectRef idx="1">
+            <a:schemeClr val="dk1"/>
+          </a:effectRef>
+          <a:fontRef idx="minor">
+            <a:schemeClr val="dk1"/>
+          </a:fontRef>
+        </p:style>
+        <p:txBody>
+          <a:bodyPr anchor="ctr"/>
+          <a:lstStyle/>
+          <a:p>
+            <a:pPr algn="ctr">
+              <a:defRPr/>
+            </a:pPr>
+            <a:r>
+              <a:rPr lang="en-US" sz="1200" dirty="0">
+                <a:solidFill>
+                  <a:schemeClr val="tx1"/>
+                </a:solidFill>
+              </a:rPr>
+              <a:t>Raw sequence data</a:t>
+            </a:r>
+          </a:p>
+          <a:p>
+            <a:pPr algn="ctr">
+              <a:defRPr/>
+            </a:pPr>
+            <a:r>
+              <a:rPr lang="en-US" sz="1200" dirty="0">
+                <a:solidFill>
+                  <a:schemeClr val="tx1"/>
+                </a:solidFill>
+              </a:rPr>
+              <a:t>(.</a:t>
+            </a:r>
+            <a:r>
+              <a:rPr lang="en-US" sz="1200" dirty="0" err="1">
+                <a:solidFill>
+                  <a:schemeClr val="tx1"/>
+                </a:solidFill>
+              </a:rPr>
+              <a:t>fastq</a:t>
+            </a:r>
+            <a:r>
+              <a:rPr lang="en-US" sz="1200" dirty="0">
+                <a:solidFill>
+                  <a:schemeClr val="tx1"/>
+                </a:solidFill>
+              </a:rPr>
+              <a:t> files)</a:t>
+            </a:r>
+          </a:p>
+        </p:txBody>
+      </p:sp>
+      <p:cxnSp>
+        <p:nvCxnSpPr>
+          <p:cNvPr id="32" name="Straight Arrow Connector 31"/>
+          <p:cNvCxnSpPr>
+            <a:stCxn id="31" idx="0"/>
+            <a:endCxn id="7" idx="2"/>
+          </p:cNvCxnSpPr>
+          <p:nvPr/>
+        </p:nvCxnSpPr>
+        <p:spPr>
+          <a:xfrm flipH="1" flipV="1">
+            <a:off x="1184004" y="3190010"/>
+            <a:ext cx="0" cy="576263"/>
+          </a:xfrm>
+          <a:prstGeom prst="straightConnector1">
+            <a:avLst/>
+          </a:prstGeom>
+          <a:ln>
+            <a:tailEnd type="arrow"/>
+          </a:ln>
+        </p:spPr>
+        <p:style>
+          <a:lnRef idx="2">
+            <a:schemeClr val="dk1"/>
+          </a:lnRef>
+          <a:fillRef idx="0">
+            <a:schemeClr val="dk1"/>
+          </a:fillRef>
+          <a:effectRef idx="1">
+            <a:schemeClr val="dk1"/>
+          </a:effectRef>
+          <a:fontRef idx="minor">
+            <a:schemeClr val="tx1"/>
+          </a:fontRef>
+        </p:style>
+      </p:cxnSp>
+      <p:cxnSp>
+        <p:nvCxnSpPr>
+          <p:cNvPr id="33" name="Straight Arrow Connector 32"/>
+          <p:cNvCxnSpPr>
+            <a:stCxn id="30" idx="0"/>
+            <a:endCxn id="10" idx="2"/>
+          </p:cNvCxnSpPr>
+          <p:nvPr/>
+        </p:nvCxnSpPr>
+        <p:spPr>
+          <a:xfrm flipV="1">
+            <a:off x="2841354" y="3190010"/>
+            <a:ext cx="7937" cy="576263"/>
+          </a:xfrm>
+          <a:prstGeom prst="straightConnector1">
+            <a:avLst/>
+          </a:prstGeom>
+          <a:ln>
+            <a:tailEnd type="arrow"/>
+          </a:ln>
+        </p:spPr>
+        <p:style>
+          <a:lnRef idx="2">
+            <a:schemeClr val="dk1"/>
+          </a:lnRef>
+          <a:fillRef idx="0">
+            <a:schemeClr val="dk1"/>
+          </a:fillRef>
+          <a:effectRef idx="1">
+            <a:schemeClr val="dk1"/>
+          </a:effectRef>
+          <a:fontRef idx="minor">
+            <a:schemeClr val="tx1"/>
+          </a:fontRef>
+        </p:style>
+      </p:cxnSp>
+      <p:cxnSp>
+        <p:nvCxnSpPr>
+          <p:cNvPr id="34" name="Straight Arrow Connector 33"/>
+          <p:cNvCxnSpPr>
+            <a:stCxn id="29" idx="0"/>
+            <a:endCxn id="13" idx="2"/>
+          </p:cNvCxnSpPr>
+          <p:nvPr/>
+        </p:nvCxnSpPr>
+        <p:spPr>
+          <a:xfrm flipV="1">
+            <a:off x="4497116" y="3190010"/>
+            <a:ext cx="0" cy="576263"/>
+          </a:xfrm>
+          <a:prstGeom prst="straightConnector1">
+            <a:avLst/>
+          </a:prstGeom>
+          <a:ln>
+            <a:tailEnd type="arrow"/>
+          </a:ln>
+        </p:spPr>
+        <p:style>
+          <a:lnRef idx="2">
+            <a:schemeClr val="dk1"/>
+          </a:lnRef>
+          <a:fillRef idx="0">
+            <a:schemeClr val="dk1"/>
+          </a:fillRef>
+          <a:effectRef idx="1">
+            <a:schemeClr val="dk1"/>
+          </a:effectRef>
+          <a:fontRef idx="minor">
+            <a:schemeClr val="tx1"/>
+          </a:fontRef>
+        </p:style>
+      </p:cxnSp>
+      <p:sp>
+        <p:nvSpPr>
+          <p:cNvPr id="35" name="TextBox 3"/>
+          <p:cNvSpPr txBox="1">
+            <a:spLocks noChangeArrowheads="1"/>
+          </p:cNvSpPr>
+          <p:nvPr/>
+        </p:nvSpPr>
+        <p:spPr bwMode="auto">
+          <a:xfrm>
+            <a:off x="2441304" y="4753698"/>
+            <a:ext cx="723900" cy="307975"/>
+          </a:xfrm>
+          <a:prstGeom prst="rect">
+            <a:avLst/>
+          </a:prstGeom>
+          <a:noFill/>
+          <a:ln>
+            <a:noFill/>
+          </a:ln>
+          <a:extLst>
+            <a:ext uri="{909E8E84-426E-40dd-AFC4-6F175D3DCCD1}">
+              <a14:hiddenFill xmlns:a14="http://schemas.microsoft.com/office/drawing/2010/main">
+                <a:solidFill>
+                  <a:srgbClr val="FFFFFF"/>
+                </a:solidFill>
+              </a14:hiddenFill>
+            </a:ext>
+            <a:ext uri="{91240B29-F687-4f45-9708-019B960494DF}">
+              <a14:hiddenLine xmlns:a14="http://schemas.microsoft.com/office/drawing/2010/main" w="9525">
+                <a:solidFill>
+                  <a:srgbClr val="000000"/>
+                </a:solidFill>
+                <a:miter lim="800000"/>
+                <a:headEnd/>
+                <a:tailEnd/>
+              </a14:hiddenLine>
+            </a:ext>
+          </a:extLst>
+        </p:spPr>
+        <p:txBody>
+          <a:bodyPr wrap="none">
+            <a:spAutoFit/>
+          </a:bodyPr>
+          <a:lstStyle>
+            <a:lvl1pPr eaLnBrk="0" hangingPunct="0">
+              <a:defRPr sz="2400">
+                <a:solidFill>
+                  <a:schemeClr val="tx1"/>
+                </a:solidFill>
+                <a:latin typeface="Arial" charset="0"/>
+                <a:ea typeface="ＭＳ Ｐゴシック" charset="0"/>
+                <a:cs typeface="ＭＳ Ｐゴシック" charset="0"/>
+              </a:defRPr>
+            </a:lvl1pPr>
+            <a:lvl2pPr marL="742950" indent="-285750" eaLnBrk="0" hangingPunct="0">
+              <a:defRPr sz="2400">
+                <a:solidFill>
+                  <a:schemeClr val="tx1"/>
+                </a:solidFill>
+                <a:latin typeface="Arial" charset="0"/>
+                <a:ea typeface="ＭＳ Ｐゴシック" charset="0"/>
+              </a:defRPr>
+            </a:lvl2pPr>
+            <a:lvl3pPr marL="1143000" indent="-228600" eaLnBrk="0" hangingPunct="0">
+              <a:defRPr sz="2400">
+                <a:solidFill>
+                  <a:schemeClr val="tx1"/>
+                </a:solidFill>
+                <a:latin typeface="Arial" charset="0"/>
+                <a:ea typeface="ＭＳ Ｐゴシック" charset="0"/>
+              </a:defRPr>
+            </a:lvl3pPr>
+            <a:lvl4pPr marL="1600200" indent="-228600" eaLnBrk="0" hangingPunct="0">
+              <a:defRPr sz="2400">
+                <a:solidFill>
+                  <a:schemeClr val="tx1"/>
+                </a:solidFill>
+                <a:latin typeface="Arial" charset="0"/>
+                <a:ea typeface="ＭＳ Ｐゴシック" charset="0"/>
+              </a:defRPr>
+            </a:lvl4pPr>
+            <a:lvl5pPr marL="2057400" indent="-228600" eaLnBrk="0" hangingPunct="0">
+              <a:defRPr sz="2400">
+                <a:solidFill>
+                  <a:schemeClr val="tx1"/>
+                </a:solidFill>
+                <a:latin typeface="Arial" charset="0"/>
+                <a:ea typeface="ＭＳ Ｐゴシック" charset="0"/>
+              </a:defRPr>
+            </a:lvl5pPr>
+            <a:lvl6pPr marL="2514600" indent="-228600" eaLnBrk="0" fontAlgn="base" hangingPunct="0">
+              <a:spcBef>
+                <a:spcPct val="0"/>
+              </a:spcBef>
+              <a:spcAft>
+                <a:spcPct val="0"/>
+              </a:spcAft>
+              <a:defRPr sz="2400">
+                <a:solidFill>
+                  <a:schemeClr val="tx1"/>
+                </a:solidFill>
+                <a:latin typeface="Arial" charset="0"/>
+                <a:ea typeface="ＭＳ Ｐゴシック" charset="0"/>
+              </a:defRPr>
+            </a:lvl6pPr>
+            <a:lvl7pPr marL="2971800" indent="-228600" eaLnBrk="0" fontAlgn="base" hangingPunct="0">
+              <a:spcBef>
+                <a:spcPct val="0"/>
+              </a:spcBef>
+              <a:spcAft>
+                <a:spcPct val="0"/>
+              </a:spcAft>
+              <a:defRPr sz="2400">
+                <a:solidFill>
+                  <a:schemeClr val="tx1"/>
+                </a:solidFill>
+                <a:latin typeface="Arial" charset="0"/>
+                <a:ea typeface="ＭＳ Ｐゴシック" charset="0"/>
+              </a:defRPr>
+            </a:lvl7pPr>
+            <a:lvl8pPr marL="3429000" indent="-228600" eaLnBrk="0" fontAlgn="base" hangingPunct="0">
+              <a:spcBef>
+                <a:spcPct val="0"/>
+              </a:spcBef>
+              <a:spcAft>
+                <a:spcPct val="0"/>
+              </a:spcAft>
+              <a:defRPr sz="2400">
+                <a:solidFill>
+                  <a:schemeClr val="tx1"/>
+                </a:solidFill>
+                <a:latin typeface="Arial" charset="0"/>
+                <a:ea typeface="ＭＳ Ｐゴシック" charset="0"/>
+              </a:defRPr>
+            </a:lvl8pPr>
+            <a:lvl9pPr marL="3886200" indent="-228600" eaLnBrk="0" fontAlgn="base" hangingPunct="0">
+              <a:spcBef>
+                <a:spcPct val="0"/>
+              </a:spcBef>
+              <a:spcAft>
+                <a:spcPct val="0"/>
+              </a:spcAft>
+              <a:defRPr sz="2400">
+                <a:solidFill>
+                  <a:schemeClr val="tx1"/>
+                </a:solidFill>
+                <a:latin typeface="Arial" charset="0"/>
+                <a:ea typeface="ＭＳ Ｐゴシック" charset="0"/>
+              </a:defRPr>
+            </a:lvl9pPr>
+          </a:lstStyle>
+          <a:p>
+            <a:pPr eaLnBrk="1" hangingPunct="1"/>
+            <a:r>
+              <a:rPr lang="en-US" sz="1400" b="1"/>
+              <a:t>Inputs</a:t>
+            </a:r>
+          </a:p>
+        </p:txBody>
+      </p:sp>
       <p:sp>
         <p:nvSpPr>
           <p:cNvPr id="36" name="TextBox 3"/>
@@ -5518,8 +7810,8 @@
               <a:t>Module </a:t>
             </a:r>
             <a:r>
-              <a:rPr lang="en-US" sz="1600" b="1" dirty="0" smtClean="0"/>
-              <a:t>2</a:t>
+              <a:rPr lang="en-US" sz="1600" b="1" dirty="0"/>
+              <a:t>1</a:t>
             </a:r>
             <a:endParaRPr lang="en-US" sz="1600" b="1" dirty="0"/>
           </a:p>
@@ -5538,7 +7830,7 @@
 </p:sld>
 </file>
 
-<file path=ppt/slides/slide2.xml><?xml version="1.0" encoding="utf-8"?>
+<file path=ppt/slides/slide3.xml><?xml version="1.0" encoding="utf-8"?>
 <p:sld xmlns:a="http://schemas.openxmlformats.org/drawingml/2006/main" xmlns:r="http://schemas.openxmlformats.org/officeDocument/2006/relationships" xmlns:p="http://schemas.openxmlformats.org/presentationml/2006/main">
   <p:cSld>
     <p:spTree>
@@ -7853,8 +10145,8 @@
               <a:t>Module </a:t>
             </a:r>
             <a:r>
-              <a:rPr lang="en-US" sz="1600" b="1" dirty="0" smtClean="0"/>
-              <a:t>3</a:t>
+              <a:rPr lang="en-US" sz="1600" b="1" dirty="0"/>
+              <a:t>2</a:t>
             </a:r>
             <a:endParaRPr lang="en-US" sz="1600" b="1" dirty="0"/>
           </a:p>
@@ -7880,7 +10172,7 @@
 </p:sld>
 </file>
 
-<file path=ppt/slides/slide3.xml><?xml version="1.0" encoding="utf-8"?>
+<file path=ppt/slides/slide4.xml><?xml version="1.0" encoding="utf-8"?>
 <p:sld xmlns:a="http://schemas.openxmlformats.org/drawingml/2006/main" xmlns:r="http://schemas.openxmlformats.org/officeDocument/2006/relationships" xmlns:p="http://schemas.openxmlformats.org/presentationml/2006/main">
   <p:cSld>
     <p:spTree>
@@ -8132,8 +10424,8 @@
               <a:t>Module </a:t>
             </a:r>
             <a:r>
-              <a:rPr lang="en-US" sz="1600" b="1" dirty="0" smtClean="0"/>
-              <a:t>4</a:t>
+              <a:rPr lang="en-US" sz="1600" b="1" dirty="0"/>
+              <a:t>3</a:t>
             </a:r>
             <a:endParaRPr lang="en-US" sz="1600" b="1" dirty="0"/>
           </a:p>
@@ -10413,7 +12705,7 @@
 </p:sld>
 </file>
 
-<file path=ppt/slides/slide4.xml><?xml version="1.0" encoding="utf-8"?>
+<file path=ppt/slides/slide5.xml><?xml version="1.0" encoding="utf-8"?>
 <p:sld xmlns:a="http://schemas.openxmlformats.org/drawingml/2006/main" xmlns:r="http://schemas.openxmlformats.org/officeDocument/2006/relationships" xmlns:p="http://schemas.openxmlformats.org/presentationml/2006/main">
   <p:cSld>
     <p:spTree>
@@ -10589,12 +12881,8 @@
               <a:t>Module </a:t>
             </a:r>
             <a:r>
-              <a:rPr lang="en-US" sz="1600" b="1" dirty="0"/>
-              <a:t>5</a:t>
-            </a:r>
-            <a:r>
               <a:rPr lang="en-US" sz="1600" b="1" dirty="0" smtClean="0"/>
-              <a:t> </a:t>
+              <a:t>4 </a:t>
             </a:r>
             <a:r>
               <a:rPr lang="en-US" sz="1600" b="1" dirty="0"/>

</xml_diff>

<commit_message>
Update the RNA-seq flow chart images to HISAT2/StringTie/Ballgown.
</commit_message>
<xml_diff>
--- a/Images/RNA-seq_Flowchart.pptx
+++ b/Images/RNA-seq_Flowchart.pptx
@@ -292,7 +292,7 @@
           <a:p>
             <a:fld id="{BC7EBC0B-66B3-6748-B539-3251E59579B9}" type="datetimeFigureOut">
               <a:rPr lang="en-US" smtClean="0"/>
-              <a:t>4/29/15</a:t>
+              <a:t>11/13/16</a:t>
             </a:fld>
             <a:endParaRPr lang="en-US"/>
           </a:p>
@@ -462,7 +462,7 @@
           <a:p>
             <a:fld id="{BC7EBC0B-66B3-6748-B539-3251E59579B9}" type="datetimeFigureOut">
               <a:rPr lang="en-US" smtClean="0"/>
-              <a:t>4/29/15</a:t>
+              <a:t>11/13/16</a:t>
             </a:fld>
             <a:endParaRPr lang="en-US"/>
           </a:p>
@@ -642,7 +642,7 @@
           <a:p>
             <a:fld id="{BC7EBC0B-66B3-6748-B539-3251E59579B9}" type="datetimeFigureOut">
               <a:rPr lang="en-US" smtClean="0"/>
-              <a:t>4/29/15</a:t>
+              <a:t>11/13/16</a:t>
             </a:fld>
             <a:endParaRPr lang="en-US"/>
           </a:p>
@@ -812,7 +812,7 @@
           <a:p>
             <a:fld id="{BC7EBC0B-66B3-6748-B539-3251E59579B9}" type="datetimeFigureOut">
               <a:rPr lang="en-US" smtClean="0"/>
-              <a:t>4/29/15</a:t>
+              <a:t>11/13/16</a:t>
             </a:fld>
             <a:endParaRPr lang="en-US"/>
           </a:p>
@@ -1058,7 +1058,7 @@
           <a:p>
             <a:fld id="{BC7EBC0B-66B3-6748-B539-3251E59579B9}" type="datetimeFigureOut">
               <a:rPr lang="en-US" smtClean="0"/>
-              <a:t>4/29/15</a:t>
+              <a:t>11/13/16</a:t>
             </a:fld>
             <a:endParaRPr lang="en-US"/>
           </a:p>
@@ -1346,7 +1346,7 @@
           <a:p>
             <a:fld id="{BC7EBC0B-66B3-6748-B539-3251E59579B9}" type="datetimeFigureOut">
               <a:rPr lang="en-US" smtClean="0"/>
-              <a:t>4/29/15</a:t>
+              <a:t>11/13/16</a:t>
             </a:fld>
             <a:endParaRPr lang="en-US"/>
           </a:p>
@@ -1768,7 +1768,7 @@
           <a:p>
             <a:fld id="{BC7EBC0B-66B3-6748-B539-3251E59579B9}" type="datetimeFigureOut">
               <a:rPr lang="en-US" smtClean="0"/>
-              <a:t>4/29/15</a:t>
+              <a:t>11/13/16</a:t>
             </a:fld>
             <a:endParaRPr lang="en-US"/>
           </a:p>
@@ -1886,7 +1886,7 @@
           <a:p>
             <a:fld id="{BC7EBC0B-66B3-6748-B539-3251E59579B9}" type="datetimeFigureOut">
               <a:rPr lang="en-US" smtClean="0"/>
-              <a:t>4/29/15</a:t>
+              <a:t>11/13/16</a:t>
             </a:fld>
             <a:endParaRPr lang="en-US"/>
           </a:p>
@@ -1981,7 +1981,7 @@
           <a:p>
             <a:fld id="{BC7EBC0B-66B3-6748-B539-3251E59579B9}" type="datetimeFigureOut">
               <a:rPr lang="en-US" smtClean="0"/>
-              <a:t>4/29/15</a:t>
+              <a:t>11/13/16</a:t>
             </a:fld>
             <a:endParaRPr lang="en-US"/>
           </a:p>
@@ -2258,7 +2258,7 @@
           <a:p>
             <a:fld id="{BC7EBC0B-66B3-6748-B539-3251E59579B9}" type="datetimeFigureOut">
               <a:rPr lang="en-US" smtClean="0"/>
-              <a:t>4/29/15</a:t>
+              <a:t>11/13/16</a:t>
             </a:fld>
             <a:endParaRPr lang="en-US"/>
           </a:p>
@@ -2511,7 +2511,7 @@
           <a:p>
             <a:fld id="{BC7EBC0B-66B3-6748-B539-3251E59579B9}" type="datetimeFigureOut">
               <a:rPr lang="en-US" smtClean="0"/>
-              <a:t>4/29/15</a:t>
+              <a:t>11/13/16</a:t>
             </a:fld>
             <a:endParaRPr lang="en-US"/>
           </a:p>
@@ -2724,7 +2724,7 @@
           <a:p>
             <a:fld id="{BC7EBC0B-66B3-6748-B539-3251E59579B9}" type="datetimeFigureOut">
               <a:rPr lang="en-US" smtClean="0"/>
-              <a:t>4/29/15</a:t>
+              <a:t>11/13/16</a:t>
             </a:fld>
             <a:endParaRPr lang="en-US"/>
           </a:p>
@@ -3556,29 +3556,18 @@
                 <a:defRPr/>
               </a:pPr>
               <a:r>
-                <a:rPr lang="en-US" sz="1200" dirty="0">
+                <a:rPr lang="en-US" sz="1200" dirty="0" smtClean="0">
                   <a:solidFill>
                     <a:schemeClr val="tx1"/>
                   </a:solidFill>
                 </a:rPr>
-                <a:t>Bowtie/</a:t>
+                <a:t>HISAT2</a:t>
               </a:r>
-              <a:r>
-                <a:rPr lang="en-US" sz="1200" dirty="0" err="1">
-                  <a:solidFill>
-                    <a:schemeClr val="tx1"/>
-                  </a:solidFill>
-                </a:rPr>
-                <a:t>TopHat</a:t>
-              </a:r>
-              <a:r>
-                <a:rPr lang="en-US" sz="1200" dirty="0">
-                  <a:solidFill>
-                    <a:schemeClr val="tx1"/>
-                  </a:solidFill>
-                </a:rPr>
-                <a:t> alignment (genome)</a:t>
-              </a:r>
+              <a:endParaRPr lang="en-US" sz="1200" dirty="0">
+                <a:solidFill>
+                  <a:schemeClr val="tx1"/>
+                </a:solidFill>
+              </a:endParaRPr>
             </a:p>
           </p:txBody>
         </p:sp>
@@ -3797,13 +3786,18 @@
                 <a:defRPr/>
               </a:pPr>
               <a:r>
-                <a:rPr lang="en-US" sz="1200" dirty="0">
+                <a:rPr lang="en-US" sz="1200" dirty="0" err="1" smtClean="0">
                   <a:solidFill>
                     <a:schemeClr val="tx1"/>
                   </a:solidFill>
                 </a:rPr>
-                <a:t>Cufflinks</a:t>
+                <a:t>StringTie</a:t>
               </a:r>
+              <a:endParaRPr lang="en-US" sz="1200" dirty="0">
+                <a:solidFill>
+                  <a:schemeClr val="tx1"/>
+                </a:solidFill>
+              </a:endParaRPr>
             </a:p>
           </p:txBody>
         </p:sp>
@@ -3962,7 +3956,7 @@
             <a:p>
               <a:pPr algn="ctr" eaLnBrk="1" hangingPunct="1"/>
               <a:r>
-                <a:rPr lang="en-US" sz="1400" b="1"/>
+                <a:rPr lang="en-US" sz="1400" b="1" dirty="0"/>
                 <a:t>Transcript compilation</a:t>
               </a:r>
             </a:p>
@@ -4022,29 +4016,18 @@
                 <a:defRPr/>
               </a:pPr>
               <a:r>
-                <a:rPr lang="en-US" sz="1200" dirty="0">
+                <a:rPr lang="en-US" sz="1200" dirty="0" err="1" smtClean="0">
                   <a:solidFill>
                     <a:schemeClr val="tx1"/>
                   </a:solidFill>
                 </a:rPr>
-                <a:t>Cufflinks (</a:t>
+                <a:t>StringTie</a:t>
               </a:r>
-              <a:r>
-                <a:rPr lang="en-US" sz="1200" dirty="0" err="1">
-                  <a:solidFill>
-                    <a:schemeClr val="tx1"/>
-                  </a:solidFill>
-                </a:rPr>
-                <a:t>cuffmerge</a:t>
-              </a:r>
-              <a:r>
-                <a:rPr lang="en-US" sz="1200" dirty="0">
-                  <a:solidFill>
-                    <a:schemeClr val="tx1"/>
-                  </a:solidFill>
-                </a:rPr>
-                <a:t>)</a:t>
-              </a:r>
+              <a:endParaRPr lang="en-US" sz="1200" dirty="0">
+                <a:solidFill>
+                  <a:schemeClr val="tx1"/>
+                </a:solidFill>
+              </a:endParaRPr>
             </a:p>
           </p:txBody>
         </p:sp>
@@ -4059,7 +4042,7 @@
           <p:spPr bwMode="auto">
             <a:xfrm>
               <a:off x="5148064" y="1818692"/>
-              <a:ext cx="1656184" cy="523220"/>
+              <a:ext cx="1656184" cy="523392"/>
             </a:xfrm>
             <a:prstGeom prst="rect">
               <a:avLst/>
@@ -4203,9 +4186,10 @@
             <a:p>
               <a:pPr algn="ctr" eaLnBrk="1" hangingPunct="1"/>
               <a:r>
-                <a:rPr lang="en-US" sz="1400" b="1"/>
-                <a:t>Gene identification</a:t>
+                <a:rPr lang="en-US" sz="1400" b="1" dirty="0" smtClean="0"/>
+                <a:t>Expression estimation</a:t>
               </a:r>
+              <a:endParaRPr lang="en-US" sz="1400" b="1" dirty="0"/>
             </a:p>
           </p:txBody>
         </p:sp>
@@ -4263,31 +4247,18 @@
                 <a:defRPr/>
               </a:pPr>
               <a:r>
-                <a:rPr lang="en-US" sz="1200" dirty="0" err="1">
+                <a:rPr lang="en-US" sz="1200" dirty="0" err="1" smtClean="0">
                   <a:solidFill>
                     <a:schemeClr val="tx1"/>
                   </a:solidFill>
                 </a:rPr>
-                <a:t>Cuffdiff</a:t>
+                <a:t>Ballgown</a:t>
               </a:r>
               <a:endParaRPr lang="en-US" sz="1200" dirty="0">
                 <a:solidFill>
                   <a:schemeClr val="tx1"/>
                 </a:solidFill>
               </a:endParaRPr>
-            </a:p>
-            <a:p>
-              <a:pPr algn="ctr">
-                <a:defRPr/>
-              </a:pPr>
-              <a:r>
-                <a:rPr lang="en-US" sz="1200" dirty="0">
-                  <a:solidFill>
-                    <a:schemeClr val="tx1"/>
-                  </a:solidFill>
-                </a:rPr>
-                <a:t>(A:B comparison)</a:t>
-              </a:r>
             </a:p>
           </p:txBody>
         </p:sp>
@@ -4506,12 +4477,20 @@
                 <a:defRPr/>
               </a:pPr>
               <a:r>
-                <a:rPr lang="en-US" sz="1200" dirty="0" err="1">
+                <a:rPr lang="en-US" sz="1200" dirty="0" err="1" smtClean="0">
                   <a:solidFill>
                     <a:schemeClr val="tx1"/>
                   </a:solidFill>
                 </a:rPr>
-                <a:t>CummRbund</a:t>
+                <a:t>Ballgown</a:t>
+              </a:r>
+              <a:r>
+                <a:rPr lang="en-US" sz="1200" dirty="0" smtClean="0">
+                  <a:solidFill>
+                    <a:schemeClr val="tx1"/>
+                  </a:solidFill>
+                </a:rPr>
+                <a:t> &amp; R</a:t>
               </a:r>
               <a:endParaRPr lang="en-US" sz="1200" dirty="0">
                 <a:solidFill>
@@ -5847,29 +5826,18 @@
                 <a:defRPr/>
               </a:pPr>
               <a:r>
-                <a:rPr lang="en-US" sz="1200" dirty="0">
+                <a:rPr lang="en-US" sz="1200" dirty="0" smtClean="0">
                   <a:solidFill>
                     <a:schemeClr val="tx1"/>
                   </a:solidFill>
                 </a:rPr>
-                <a:t>Bowtie/</a:t>
+                <a:t>HISAT2</a:t>
               </a:r>
-              <a:r>
-                <a:rPr lang="en-US" sz="1200" dirty="0" err="1">
-                  <a:solidFill>
-                    <a:schemeClr val="tx1"/>
-                  </a:solidFill>
-                </a:rPr>
-                <a:t>TopHat</a:t>
-              </a:r>
-              <a:r>
-                <a:rPr lang="en-US" sz="1200" dirty="0">
-                  <a:solidFill>
-                    <a:schemeClr val="tx1"/>
-                  </a:solidFill>
-                </a:rPr>
-                <a:t> alignment (genome)</a:t>
-              </a:r>
+              <a:endParaRPr lang="en-US" sz="1200" dirty="0">
+                <a:solidFill>
+                  <a:schemeClr val="tx1"/>
+                </a:solidFill>
+              </a:endParaRPr>
             </a:p>
           </p:txBody>
         </p:sp>
@@ -6088,13 +6056,18 @@
                 <a:defRPr/>
               </a:pPr>
               <a:r>
-                <a:rPr lang="en-US" sz="1200" dirty="0">
+                <a:rPr lang="en-US" sz="1200" dirty="0" err="1" smtClean="0">
                   <a:solidFill>
                     <a:schemeClr val="tx1"/>
                   </a:solidFill>
                 </a:rPr>
-                <a:t>Cufflinks</a:t>
+                <a:t>StringTie</a:t>
               </a:r>
+              <a:endParaRPr lang="en-US" sz="1200" dirty="0">
+                <a:solidFill>
+                  <a:schemeClr val="tx1"/>
+                </a:solidFill>
+              </a:endParaRPr>
             </a:p>
           </p:txBody>
         </p:sp>
@@ -6313,29 +6286,18 @@
                 <a:defRPr/>
               </a:pPr>
               <a:r>
-                <a:rPr lang="en-US" sz="1200" dirty="0">
+                <a:rPr lang="en-US" sz="1200" dirty="0" err="1" smtClean="0">
                   <a:solidFill>
                     <a:schemeClr val="tx1"/>
                   </a:solidFill>
                 </a:rPr>
-                <a:t>Cufflinks (</a:t>
+                <a:t>StringTie</a:t>
               </a:r>
-              <a:r>
-                <a:rPr lang="en-US" sz="1200" dirty="0" err="1">
-                  <a:solidFill>
-                    <a:schemeClr val="tx1"/>
-                  </a:solidFill>
-                </a:rPr>
-                <a:t>cuffmerge</a:t>
-              </a:r>
-              <a:r>
-                <a:rPr lang="en-US" sz="1200" dirty="0">
-                  <a:solidFill>
-                    <a:schemeClr val="tx1"/>
-                  </a:solidFill>
-                </a:rPr>
-                <a:t>)</a:t>
-              </a:r>
+              <a:endParaRPr lang="en-US" sz="1200" dirty="0">
+                <a:solidFill>
+                  <a:schemeClr val="tx1"/>
+                </a:solidFill>
+              </a:endParaRPr>
             </a:p>
           </p:txBody>
         </p:sp>
@@ -6350,7 +6312,7 @@
           <p:spPr bwMode="auto">
             <a:xfrm>
               <a:off x="5148064" y="1818692"/>
-              <a:ext cx="1656184" cy="523220"/>
+              <a:ext cx="1656184" cy="523392"/>
             </a:xfrm>
             <a:prstGeom prst="rect">
               <a:avLst/>
@@ -6494,9 +6456,10 @@
             <a:p>
               <a:pPr algn="ctr" eaLnBrk="1" hangingPunct="1"/>
               <a:r>
-                <a:rPr lang="en-US" sz="1400" b="1"/>
-                <a:t>Gene identification</a:t>
+                <a:rPr lang="en-US" sz="1400" b="1" dirty="0" smtClean="0"/>
+                <a:t>Expression estimation</a:t>
               </a:r>
+              <a:endParaRPr lang="en-US" sz="1400" b="1" dirty="0"/>
             </a:p>
           </p:txBody>
         </p:sp>
@@ -6554,31 +6517,18 @@
                 <a:defRPr/>
               </a:pPr>
               <a:r>
-                <a:rPr lang="en-US" sz="1200" dirty="0" err="1">
+                <a:rPr lang="en-US" sz="1200" smtClean="0">
                   <a:solidFill>
                     <a:schemeClr val="tx1"/>
                   </a:solidFill>
                 </a:rPr>
-                <a:t>Cuffdiff</a:t>
+                <a:t>Ballgown</a:t>
               </a:r>
               <a:endParaRPr lang="en-US" sz="1200" dirty="0">
                 <a:solidFill>
                   <a:schemeClr val="tx1"/>
                 </a:solidFill>
               </a:endParaRPr>
-            </a:p>
-            <a:p>
-              <a:pPr algn="ctr">
-                <a:defRPr/>
-              </a:pPr>
-              <a:r>
-                <a:rPr lang="en-US" sz="1200" dirty="0">
-                  <a:solidFill>
-                    <a:schemeClr val="tx1"/>
-                  </a:solidFill>
-                </a:rPr>
-                <a:t>(A:B comparison)</a:t>
-              </a:r>
             </a:p>
           </p:txBody>
         </p:sp>
@@ -6797,12 +6747,20 @@
                 <a:defRPr/>
               </a:pPr>
               <a:r>
-                <a:rPr lang="en-US" sz="1200" dirty="0" err="1">
+                <a:rPr lang="en-US" sz="1200" dirty="0" err="1" smtClean="0">
                   <a:solidFill>
                     <a:schemeClr val="tx1"/>
                   </a:solidFill>
                 </a:rPr>
-                <a:t>CummRbund</a:t>
+                <a:t>Ballgown</a:t>
+              </a:r>
+              <a:r>
+                <a:rPr lang="en-US" sz="1200" dirty="0" smtClean="0">
+                  <a:solidFill>
+                    <a:schemeClr val="tx1"/>
+                  </a:solidFill>
+                </a:rPr>
+                <a:t> &amp; R</a:t>
               </a:r>
               <a:endParaRPr lang="en-US" sz="1200" dirty="0">
                 <a:solidFill>
@@ -7807,13 +7765,8 @@
             <a:pPr eaLnBrk="1" hangingPunct="1"/>
             <a:r>
               <a:rPr lang="en-US" sz="1600" b="1" dirty="0"/>
-              <a:t>Module </a:t>
+              <a:t>Module 1</a:t>
             </a:r>
-            <a:r>
-              <a:rPr lang="en-US" sz="1600" b="1" dirty="0"/>
-              <a:t>1</a:t>
-            </a:r>
-            <a:endParaRPr lang="en-US" sz="1600" b="1" dirty="0"/>
           </a:p>
         </p:txBody>
       </p:sp>
@@ -8272,13 +8225,18 @@
                 <a:defRPr/>
               </a:pPr>
               <a:r>
-                <a:rPr lang="en-US" sz="1200" dirty="0">
+                <a:rPr lang="en-US" sz="1200" dirty="0" smtClean="0">
                   <a:solidFill>
                     <a:schemeClr val="tx1"/>
                   </a:solidFill>
                 </a:rPr>
-                <a:t>Bowtie/TopHat alignment (genome)</a:t>
+                <a:t>HISAT2</a:t>
               </a:r>
+              <a:endParaRPr lang="en-US" sz="1200" dirty="0">
+                <a:solidFill>
+                  <a:schemeClr val="tx1"/>
+                </a:solidFill>
+              </a:endParaRPr>
             </a:p>
           </p:txBody>
         </p:sp>
@@ -8497,13 +8455,18 @@
                 <a:defRPr/>
               </a:pPr>
               <a:r>
-                <a:rPr lang="en-US" sz="1200" dirty="0">
+                <a:rPr lang="en-US" sz="1200" dirty="0" err="1" smtClean="0">
                   <a:solidFill>
                     <a:schemeClr val="tx1"/>
                   </a:solidFill>
                 </a:rPr>
-                <a:t>Cufflinks</a:t>
+                <a:t>StringTie</a:t>
               </a:r>
+              <a:endParaRPr lang="en-US" sz="1200" dirty="0">
+                <a:solidFill>
+                  <a:schemeClr val="tx1"/>
+                </a:solidFill>
+              </a:endParaRPr>
             </a:p>
           </p:txBody>
         </p:sp>
@@ -8722,13 +8685,18 @@
                 <a:defRPr/>
               </a:pPr>
               <a:r>
-                <a:rPr lang="en-US" sz="1200" dirty="0">
+                <a:rPr lang="en-US" sz="1200" dirty="0" err="1" smtClean="0">
                   <a:solidFill>
                     <a:schemeClr val="tx1"/>
                   </a:solidFill>
                 </a:rPr>
-                <a:t>Cufflinks (cuffmerge)</a:t>
+                <a:t>StringTie</a:t>
               </a:r>
+              <a:endParaRPr lang="en-US" sz="1200" dirty="0">
+                <a:solidFill>
+                  <a:schemeClr val="tx1"/>
+                </a:solidFill>
+              </a:endParaRPr>
             </a:p>
           </p:txBody>
         </p:sp>
@@ -8743,7 +8711,7 @@
           <p:spPr bwMode="auto">
             <a:xfrm>
               <a:off x="5148064" y="1818692"/>
-              <a:ext cx="1656184" cy="523220"/>
+              <a:ext cx="1656184" cy="523392"/>
             </a:xfrm>
             <a:prstGeom prst="rect">
               <a:avLst/>
@@ -8887,9 +8855,10 @@
             <a:p>
               <a:pPr algn="ctr" eaLnBrk="1" hangingPunct="1"/>
               <a:r>
-                <a:rPr lang="en-US" sz="1400" b="1"/>
-                <a:t>Gene identification</a:t>
+                <a:rPr lang="en-US" sz="1400" b="1" dirty="0" smtClean="0"/>
+                <a:t>Expression estimation</a:t>
               </a:r>
+              <a:endParaRPr lang="en-US" sz="1400" b="1" dirty="0"/>
             </a:p>
           </p:txBody>
         </p:sp>
@@ -8947,26 +8916,18 @@
                 <a:defRPr/>
               </a:pPr>
               <a:r>
-                <a:rPr lang="en-US" sz="1200" dirty="0">
+                <a:rPr lang="en-US" sz="1200" dirty="0" err="1" smtClean="0">
                   <a:solidFill>
                     <a:schemeClr val="tx1"/>
                   </a:solidFill>
                 </a:rPr>
-                <a:t>Cuffdiff</a:t>
+                <a:t>Ballgown</a:t>
               </a:r>
-            </a:p>
-            <a:p>
-              <a:pPr algn="ctr">
-                <a:defRPr/>
-              </a:pPr>
-              <a:r>
-                <a:rPr lang="en-US" sz="1200" dirty="0">
-                  <a:solidFill>
-                    <a:schemeClr val="tx1"/>
-                  </a:solidFill>
-                </a:rPr>
-                <a:t>(A:B comparison)</a:t>
-              </a:r>
+              <a:endParaRPr lang="en-US" sz="1200" dirty="0">
+                <a:solidFill>
+                  <a:schemeClr val="tx1"/>
+                </a:solidFill>
+              </a:endParaRPr>
             </a:p>
           </p:txBody>
         </p:sp>
@@ -9185,13 +9146,26 @@
                 <a:defRPr/>
               </a:pPr>
               <a:r>
-                <a:rPr lang="en-US" sz="1200" dirty="0">
+                <a:rPr lang="en-US" sz="1200" dirty="0" err="1" smtClean="0">
                   <a:solidFill>
                     <a:schemeClr val="tx1"/>
                   </a:solidFill>
                 </a:rPr>
-                <a:t>CummRbund</a:t>
+                <a:t>Ballgown</a:t>
               </a:r>
+              <a:r>
+                <a:rPr lang="en-US" sz="1200" dirty="0" smtClean="0">
+                  <a:solidFill>
+                    <a:schemeClr val="tx1"/>
+                  </a:solidFill>
+                </a:rPr>
+                <a:t> &amp; R</a:t>
+              </a:r>
+              <a:endParaRPr lang="en-US" sz="1200" dirty="0">
+                <a:solidFill>
+                  <a:schemeClr val="tx1"/>
+                </a:solidFill>
+              </a:endParaRPr>
             </a:p>
           </p:txBody>
         </p:sp>
@@ -10142,13 +10116,8 @@
             <a:pPr eaLnBrk="1" hangingPunct="1"/>
             <a:r>
               <a:rPr lang="en-US" sz="1600" b="1" dirty="0"/>
-              <a:t>Module </a:t>
+              <a:t>Module 2</a:t>
             </a:r>
-            <a:r>
-              <a:rPr lang="en-US" sz="1600" b="1" dirty="0"/>
-              <a:t>2</a:t>
-            </a:r>
-            <a:endParaRPr lang="en-US" sz="1600" b="1" dirty="0"/>
           </a:p>
         </p:txBody>
       </p:sp>
@@ -10189,6 +10158,82 @@
           <a:chExt cx="0" cy="0"/>
         </a:xfrm>
       </p:grpSpPr>
+      <p:sp>
+        <p:nvSpPr>
+          <p:cNvPr id="37" name="Rounded Rectangle 36"/>
+          <p:cNvSpPr/>
+          <p:nvPr/>
+        </p:nvSpPr>
+        <p:spPr>
+          <a:xfrm>
+            <a:off x="3419475" y="1628775"/>
+            <a:ext cx="1657350" cy="1800225"/>
+          </a:xfrm>
+          <a:prstGeom prst="roundRect">
+            <a:avLst/>
+          </a:prstGeom>
+          <a:gradFill flip="none" rotWithShape="1">
+            <a:gsLst>
+              <a:gs pos="0">
+                <a:schemeClr val="dk1">
+                  <a:tint val="50000"/>
+                  <a:satMod val="300000"/>
+                  <a:alpha val="13000"/>
+                </a:schemeClr>
+              </a:gs>
+              <a:gs pos="35000">
+                <a:schemeClr val="dk1">
+                  <a:tint val="37000"/>
+                  <a:satMod val="300000"/>
+                  <a:alpha val="13000"/>
+                </a:schemeClr>
+              </a:gs>
+              <a:gs pos="100000">
+                <a:schemeClr val="dk1">
+                  <a:tint val="15000"/>
+                  <a:satMod val="350000"/>
+                  <a:alpha val="13000"/>
+                </a:schemeClr>
+              </a:gs>
+            </a:gsLst>
+            <a:lin ang="16200000" scaled="1"/>
+            <a:tileRect/>
+          </a:gradFill>
+          <a:ln>
+            <a:prstDash val="dash"/>
+          </a:ln>
+        </p:spPr>
+        <p:style>
+          <a:lnRef idx="1">
+            <a:schemeClr val="dk1"/>
+          </a:lnRef>
+          <a:fillRef idx="2">
+            <a:schemeClr val="dk1"/>
+          </a:fillRef>
+          <a:effectRef idx="1">
+            <a:schemeClr val="dk1"/>
+          </a:effectRef>
+          <a:fontRef idx="minor">
+            <a:schemeClr val="dk1"/>
+          </a:fontRef>
+        </p:style>
+        <p:txBody>
+          <a:bodyPr anchor="ctr"/>
+          <a:lstStyle/>
+          <a:p>
+            <a:pPr algn="ctr">
+              <a:defRPr/>
+            </a:pPr>
+            <a:endParaRPr lang="en-US">
+              <a:ln w="76200" cmpd="sng">
+                <a:noFill/>
+                <a:prstDash val="dot"/>
+              </a:ln>
+              <a:noFill/>
+            </a:endParaRPr>
+          </a:p>
+        </p:txBody>
+      </p:sp>
       <p:sp>
         <p:nvSpPr>
           <p:cNvPr id="4" name="Rounded Rectangle 3"/>
@@ -10421,13 +10466,8 @@
             <a:pPr eaLnBrk="1" hangingPunct="1"/>
             <a:r>
               <a:rPr lang="en-US" sz="1600" b="1" dirty="0"/>
-              <a:t>Module </a:t>
+              <a:t>Module 3</a:t>
             </a:r>
-            <a:r>
-              <a:rPr lang="en-US" sz="1600" b="1" dirty="0"/>
-              <a:t>3</a:t>
-            </a:r>
-            <a:endParaRPr lang="en-US" sz="1600" b="1" dirty="0"/>
           </a:p>
         </p:txBody>
       </p:sp>
@@ -10812,29 +10852,18 @@
                 <a:defRPr/>
               </a:pPr>
               <a:r>
-                <a:rPr lang="en-US" sz="1200" dirty="0">
+                <a:rPr lang="en-US" sz="1200" dirty="0" smtClean="0">
                   <a:solidFill>
                     <a:schemeClr val="tx1"/>
                   </a:solidFill>
                 </a:rPr>
-                <a:t>Bowtie/</a:t>
+                <a:t>HISAT2</a:t>
               </a:r>
-              <a:r>
-                <a:rPr lang="en-US" sz="1200" dirty="0" err="1">
-                  <a:solidFill>
-                    <a:schemeClr val="tx1"/>
-                  </a:solidFill>
-                </a:rPr>
-                <a:t>TopHat</a:t>
-              </a:r>
-              <a:r>
-                <a:rPr lang="en-US" sz="1200" dirty="0">
-                  <a:solidFill>
-                    <a:schemeClr val="tx1"/>
-                  </a:solidFill>
-                </a:rPr>
-                <a:t> alignment (genome)</a:t>
-              </a:r>
+              <a:endParaRPr lang="en-US" sz="1200" dirty="0">
+                <a:solidFill>
+                  <a:schemeClr val="tx1"/>
+                </a:solidFill>
+              </a:endParaRPr>
             </a:p>
           </p:txBody>
         </p:sp>
@@ -11053,13 +11082,18 @@
                 <a:defRPr/>
               </a:pPr>
               <a:r>
-                <a:rPr lang="en-US" sz="1200" dirty="0">
+                <a:rPr lang="en-US" sz="1200" dirty="0" err="1" smtClean="0">
                   <a:solidFill>
                     <a:schemeClr val="tx1"/>
                   </a:solidFill>
                 </a:rPr>
-                <a:t>Cufflinks</a:t>
+                <a:t>StringTie</a:t>
               </a:r>
+              <a:endParaRPr lang="en-US" sz="1200" dirty="0">
+                <a:solidFill>
+                  <a:schemeClr val="tx1"/>
+                </a:solidFill>
+              </a:endParaRPr>
             </a:p>
           </p:txBody>
         </p:sp>
@@ -11278,29 +11312,18 @@
                 <a:defRPr/>
               </a:pPr>
               <a:r>
-                <a:rPr lang="en-US" sz="1200" dirty="0">
+                <a:rPr lang="en-US" sz="1200" dirty="0" err="1" smtClean="0">
                   <a:solidFill>
                     <a:schemeClr val="tx1"/>
                   </a:solidFill>
                 </a:rPr>
-                <a:t>Cufflinks (</a:t>
+                <a:t>StringTie</a:t>
               </a:r>
-              <a:r>
-                <a:rPr lang="en-US" sz="1200" dirty="0" err="1">
-                  <a:solidFill>
-                    <a:schemeClr val="tx1"/>
-                  </a:solidFill>
-                </a:rPr>
-                <a:t>cuffmerge</a:t>
-              </a:r>
-              <a:r>
-                <a:rPr lang="en-US" sz="1200" dirty="0">
-                  <a:solidFill>
-                    <a:schemeClr val="tx1"/>
-                  </a:solidFill>
-                </a:rPr>
-                <a:t>)</a:t>
-              </a:r>
+              <a:endParaRPr lang="en-US" sz="1200" dirty="0">
+                <a:solidFill>
+                  <a:schemeClr val="tx1"/>
+                </a:solidFill>
+              </a:endParaRPr>
             </a:p>
           </p:txBody>
         </p:sp>
@@ -11315,7 +11338,7 @@
           <p:spPr bwMode="auto">
             <a:xfrm>
               <a:off x="5148064" y="1818692"/>
-              <a:ext cx="1656184" cy="523220"/>
+              <a:ext cx="1656184" cy="523392"/>
             </a:xfrm>
             <a:prstGeom prst="rect">
               <a:avLst/>
@@ -11459,9 +11482,10 @@
             <a:p>
               <a:pPr algn="ctr" eaLnBrk="1" hangingPunct="1"/>
               <a:r>
-                <a:rPr lang="en-US" sz="1400" b="1"/>
-                <a:t>Gene identification</a:t>
+                <a:rPr lang="en-US" sz="1400" b="1" dirty="0" smtClean="0"/>
+                <a:t>Expression estimation</a:t>
               </a:r>
+              <a:endParaRPr lang="en-US" sz="1400" b="1" dirty="0"/>
             </a:p>
           </p:txBody>
         </p:sp>
@@ -11519,31 +11543,18 @@
                 <a:defRPr/>
               </a:pPr>
               <a:r>
-                <a:rPr lang="en-US" sz="1200" dirty="0" err="1">
+                <a:rPr lang="en-US" sz="1200" dirty="0" err="1" smtClean="0">
                   <a:solidFill>
                     <a:schemeClr val="tx1"/>
                   </a:solidFill>
                 </a:rPr>
-                <a:t>Cuffdiff</a:t>
+                <a:t>Ballgown</a:t>
               </a:r>
               <a:endParaRPr lang="en-US" sz="1200" dirty="0">
                 <a:solidFill>
                   <a:schemeClr val="tx1"/>
                 </a:solidFill>
               </a:endParaRPr>
-            </a:p>
-            <a:p>
-              <a:pPr algn="ctr">
-                <a:defRPr/>
-              </a:pPr>
-              <a:r>
-                <a:rPr lang="en-US" sz="1200" dirty="0">
-                  <a:solidFill>
-                    <a:schemeClr val="tx1"/>
-                  </a:solidFill>
-                </a:rPr>
-                <a:t>(A:B comparison)</a:t>
-              </a:r>
             </a:p>
           </p:txBody>
         </p:sp>
@@ -11762,12 +11773,20 @@
                 <a:defRPr/>
               </a:pPr>
               <a:r>
-                <a:rPr lang="en-US" sz="1200" dirty="0" err="1">
+                <a:rPr lang="en-US" sz="1200" dirty="0" err="1" smtClean="0">
                   <a:solidFill>
                     <a:schemeClr val="tx1"/>
                   </a:solidFill>
                 </a:rPr>
-                <a:t>CummRbund</a:t>
+                <a:t>Ballgown</a:t>
+              </a:r>
+              <a:r>
+                <a:rPr lang="en-US" sz="1200" dirty="0" smtClean="0">
+                  <a:solidFill>
+                    <a:schemeClr val="tx1"/>
+                  </a:solidFill>
+                </a:rPr>
+                <a:t> &amp; R</a:t>
               </a:r>
               <a:endParaRPr lang="en-US" sz="1200" dirty="0">
                 <a:solidFill>
@@ -12616,16 +12635,46 @@
           </a:p>
         </p:txBody>
       </p:sp>
+    </p:spTree>
+    <p:extLst>
+      <p:ext uri="{BB962C8B-B14F-4D97-AF65-F5344CB8AC3E}">
+        <p14:creationId xmlns:p14="http://schemas.microsoft.com/office/powerpoint/2010/main" val="3152123186"/>
+      </p:ext>
+    </p:extLst>
+  </p:cSld>
+  <p:clrMapOvr>
+    <a:masterClrMapping/>
+  </p:clrMapOvr>
+</p:sld>
+</file>
+
+<file path=ppt/slides/slide5.xml><?xml version="1.0" encoding="utf-8"?>
+<p:sld xmlns:a="http://schemas.openxmlformats.org/drawingml/2006/main" xmlns:r="http://schemas.openxmlformats.org/officeDocument/2006/relationships" xmlns:p="http://schemas.openxmlformats.org/presentationml/2006/main">
+  <p:cSld>
+    <p:spTree>
+      <p:nvGrpSpPr>
+        <p:cNvPr id="1" name=""/>
+        <p:cNvGrpSpPr/>
+        <p:nvPr/>
+      </p:nvGrpSpPr>
+      <p:grpSpPr>
+        <a:xfrm>
+          <a:off x="0" y="0"/>
+          <a:ext cx="0" cy="0"/>
+          <a:chOff x="0" y="0"/>
+          <a:chExt cx="0" cy="0"/>
+        </a:xfrm>
+      </p:grpSpPr>
       <p:sp>
         <p:nvSpPr>
-          <p:cNvPr id="37" name="Rounded Rectangle 36"/>
+          <p:cNvPr id="44" name="Rounded Rectangle 43"/>
           <p:cNvSpPr/>
           <p:nvPr/>
         </p:nvSpPr>
         <p:spPr>
           <a:xfrm>
-            <a:off x="3419475" y="1628775"/>
-            <a:ext cx="1657350" cy="1800225"/>
+            <a:off x="3348038" y="1930125"/>
+            <a:ext cx="5184775" cy="1800225"/>
           </a:xfrm>
           <a:prstGeom prst="roundRect">
             <a:avLst/>
@@ -12682,7 +12731,7 @@
             <a:pPr algn="ctr">
               <a:defRPr/>
             </a:pPr>
-            <a:endParaRPr lang="en-US">
+            <a:endParaRPr lang="en-US" dirty="0">
               <a:ln w="76200" cmpd="sng">
                 <a:noFill/>
                 <a:prstDash val="dot"/>
@@ -12692,36 +12741,6 @@
           </a:p>
         </p:txBody>
       </p:sp>
-    </p:spTree>
-    <p:extLst>
-      <p:ext uri="{BB962C8B-B14F-4D97-AF65-F5344CB8AC3E}">
-        <p14:creationId xmlns:p14="http://schemas.microsoft.com/office/powerpoint/2010/main" val="3152123186"/>
-      </p:ext>
-    </p:extLst>
-  </p:cSld>
-  <p:clrMapOvr>
-    <a:masterClrMapping/>
-  </p:clrMapOvr>
-</p:sld>
-</file>
-
-<file path=ppt/slides/slide5.xml><?xml version="1.0" encoding="utf-8"?>
-<p:sld xmlns:a="http://schemas.openxmlformats.org/drawingml/2006/main" xmlns:r="http://schemas.openxmlformats.org/officeDocument/2006/relationships" xmlns:p="http://schemas.openxmlformats.org/presentationml/2006/main">
-  <p:cSld>
-    <p:spTree>
-      <p:nvGrpSpPr>
-        <p:cNvPr id="1" name=""/>
-        <p:cNvGrpSpPr/>
-        <p:nvPr/>
-      </p:nvGrpSpPr>
-      <p:grpSpPr>
-        <a:xfrm>
-          <a:off x="0" y="0"/>
-          <a:ext cx="0" cy="0"/>
-          <a:chOff x="0" y="0"/>
-          <a:chExt cx="0" cy="0"/>
-        </a:xfrm>
-      </p:grpSpPr>
       <p:sp>
         <p:nvSpPr>
           <p:cNvPr id="25601" name="TextBox 3"/>
@@ -12733,7 +12752,7 @@
         <p:spPr bwMode="auto">
           <a:xfrm>
             <a:off x="3521075" y="1498325"/>
-            <a:ext cx="4938713" cy="338138"/>
+            <a:ext cx="4981051" cy="338554"/>
           </a:xfrm>
           <a:prstGeom prst="rect">
             <a:avLst/>
@@ -12886,7 +12905,19 @@
             </a:r>
             <a:r>
               <a:rPr lang="en-US" sz="1600" b="1" dirty="0"/>
-              <a:t>– Rerun Cufflinks in alternative ‘modes’</a:t>
+              <a:t>– Rerun </a:t>
+            </a:r>
+            <a:r>
+              <a:rPr lang="en-US" sz="1600" b="1" dirty="0" err="1" smtClean="0"/>
+              <a:t>StringTie</a:t>
+            </a:r>
+            <a:r>
+              <a:rPr lang="en-US" sz="1600" b="1" dirty="0" smtClean="0"/>
+              <a:t> </a:t>
+            </a:r>
+            <a:r>
+              <a:rPr lang="en-US" sz="1600" b="1" dirty="0"/>
+              <a:t>in alternative ‘modes’</a:t>
             </a:r>
           </a:p>
         </p:txBody>
@@ -13272,29 +13303,18 @@
                 <a:defRPr/>
               </a:pPr>
               <a:r>
-                <a:rPr lang="en-US" sz="1200" dirty="0">
+                <a:rPr lang="en-US" sz="1200" dirty="0" smtClean="0">
                   <a:solidFill>
                     <a:schemeClr val="tx1"/>
                   </a:solidFill>
                 </a:rPr>
-                <a:t>Bowtie/</a:t>
+                <a:t>HISAT2</a:t>
               </a:r>
-              <a:r>
-                <a:rPr lang="en-US" sz="1200" dirty="0" err="1">
-                  <a:solidFill>
-                    <a:schemeClr val="tx1"/>
-                  </a:solidFill>
-                </a:rPr>
-                <a:t>TopHat</a:t>
-              </a:r>
-              <a:r>
-                <a:rPr lang="en-US" sz="1200" dirty="0">
-                  <a:solidFill>
-                    <a:schemeClr val="tx1"/>
-                  </a:solidFill>
-                </a:rPr>
-                <a:t> alignment (genome)</a:t>
-              </a:r>
+              <a:endParaRPr lang="en-US" sz="1200" dirty="0">
+                <a:solidFill>
+                  <a:schemeClr val="tx1"/>
+                </a:solidFill>
+              </a:endParaRPr>
             </a:p>
           </p:txBody>
         </p:sp>
@@ -13460,472 +13480,433 @@
           </p:txBody>
         </p:sp>
       </p:grpSp>
-      <p:grpSp>
-        <p:nvGrpSpPr>
-          <p:cNvPr id="25606" name="Group 18"/>
-          <p:cNvGrpSpPr>
-            <a:grpSpLocks/>
-          </p:cNvGrpSpPr>
+      <p:sp>
+        <p:nvSpPr>
+          <p:cNvPr id="9" name="Rounded Rectangle 8"/>
+          <p:cNvSpPr/>
           <p:nvPr/>
-        </p:nvGrpSpPr>
-        <p:grpSpPr bwMode="auto">
+        </p:nvSpPr>
+        <p:spPr bwMode="auto">
+          <a:xfrm>
+            <a:off x="3563938" y="2795313"/>
+            <a:ext cx="1368425" cy="719137"/>
+          </a:xfrm>
+          <a:prstGeom prst="roundRect">
+            <a:avLst/>
+          </a:prstGeom>
+        </p:spPr>
+        <p:style>
+          <a:lnRef idx="1">
+            <a:schemeClr val="accent1"/>
+          </a:lnRef>
+          <a:fillRef idx="2">
+            <a:schemeClr val="accent1"/>
+          </a:fillRef>
+          <a:effectRef idx="1">
+            <a:schemeClr val="accent1"/>
+          </a:effectRef>
+          <a:fontRef idx="minor">
+            <a:schemeClr val="dk1"/>
+          </a:fontRef>
+        </p:style>
+        <p:txBody>
+          <a:bodyPr anchor="ctr"/>
+          <a:lstStyle/>
+          <a:p>
+            <a:pPr algn="ctr">
+              <a:defRPr/>
+            </a:pPr>
+            <a:r>
+              <a:rPr lang="en-US" sz="1200" dirty="0" err="1" smtClean="0">
+                <a:solidFill>
+                  <a:schemeClr val="tx1"/>
+                </a:solidFill>
+              </a:rPr>
+              <a:t>StringTie</a:t>
+            </a:r>
+            <a:endParaRPr lang="en-US" sz="1200" dirty="0">
+              <a:solidFill>
+                <a:schemeClr val="tx1"/>
+              </a:solidFill>
+            </a:endParaRPr>
+          </a:p>
+        </p:txBody>
+      </p:sp>
+      <p:sp>
+        <p:nvSpPr>
+          <p:cNvPr id="25627" name="TextBox 13"/>
+          <p:cNvSpPr txBox="1">
+            <a:spLocks noChangeArrowheads="1"/>
+          </p:cNvSpPr>
+          <p:nvPr/>
+        </p:nvSpPr>
+        <p:spPr bwMode="auto">
           <a:xfrm>
             <a:off x="3419475" y="2120625"/>
-            <a:ext cx="1657350" cy="1393825"/>
-            <a:chOff x="3563889" y="1818692"/>
-            <a:chExt cx="1656184" cy="1394284"/>
+            <a:ext cx="1657350" cy="523048"/>
           </a:xfrm>
-        </p:grpSpPr>
-        <p:sp>
-          <p:nvSpPr>
-            <p:cNvPr id="9" name="Rounded Rectangle 8"/>
-            <p:cNvSpPr/>
-            <p:nvPr/>
-          </p:nvSpPr>
-          <p:spPr>
-            <a:xfrm>
-              <a:off x="3708250" y="2493602"/>
-              <a:ext cx="1367462" cy="719374"/>
-            </a:xfrm>
-            <a:prstGeom prst="roundRect">
-              <a:avLst/>
-            </a:prstGeom>
-          </p:spPr>
-          <p:style>
-            <a:lnRef idx="1">
-              <a:schemeClr val="accent1"/>
-            </a:lnRef>
-            <a:fillRef idx="2">
-              <a:schemeClr val="accent1"/>
-            </a:fillRef>
-            <a:effectRef idx="1">
-              <a:schemeClr val="accent1"/>
-            </a:effectRef>
-            <a:fontRef idx="minor">
-              <a:schemeClr val="dk1"/>
-            </a:fontRef>
-          </p:style>
-          <p:txBody>
-            <a:bodyPr anchor="ctr"/>
-            <a:lstStyle/>
-            <a:p>
-              <a:pPr algn="ctr">
-                <a:defRPr/>
-              </a:pPr>
-              <a:r>
-                <a:rPr lang="en-US" sz="1200" dirty="0">
-                  <a:solidFill>
-                    <a:schemeClr val="tx1"/>
-                  </a:solidFill>
-                </a:rPr>
-                <a:t>Cufflinks</a:t>
-              </a:r>
-            </a:p>
-          </p:txBody>
-        </p:sp>
-        <p:sp>
-          <p:nvSpPr>
-            <p:cNvPr id="25627" name="TextBox 13"/>
-            <p:cNvSpPr txBox="1">
-              <a:spLocks noChangeArrowheads="1"/>
-            </p:cNvSpPr>
-            <p:nvPr/>
-          </p:nvSpPr>
-          <p:spPr bwMode="auto">
-            <a:xfrm>
-              <a:off x="3563889" y="1818692"/>
-              <a:ext cx="1656184" cy="523220"/>
-            </a:xfrm>
-            <a:prstGeom prst="rect">
-              <a:avLst/>
-            </a:prstGeom>
+          <a:prstGeom prst="rect">
+            <a:avLst/>
+          </a:prstGeom>
+          <a:noFill/>
+          <a:ln>
             <a:noFill/>
-            <a:ln>
-              <a:noFill/>
-            </a:ln>
-            <a:extLst>
-              <a:ext uri="{909E8E84-426E-40dd-AFC4-6F175D3DCCD1}">
-                <a14:hiddenFill xmlns:a14="http://schemas.microsoft.com/office/drawing/2010/main">
-                  <a:solidFill>
-                    <a:srgbClr val="FFFFFF"/>
-                  </a:solidFill>
-                </a14:hiddenFill>
-              </a:ext>
-              <a:ext uri="{91240B29-F687-4f45-9708-019B960494DF}">
-                <a14:hiddenLine xmlns:a14="http://schemas.microsoft.com/office/drawing/2010/main" w="9525">
-                  <a:solidFill>
-                    <a:srgbClr val="000000"/>
-                  </a:solidFill>
-                  <a:miter lim="800000"/>
-                  <a:headEnd/>
-                  <a:tailEnd/>
-                </a14:hiddenLine>
-              </a:ext>
-            </a:extLst>
-          </p:spPr>
-          <p:txBody>
-            <a:bodyPr>
-              <a:spAutoFit/>
-            </a:bodyPr>
-            <a:lstStyle>
-              <a:lvl1pPr eaLnBrk="0" hangingPunct="0">
-                <a:defRPr sz="2400">
-                  <a:solidFill>
-                    <a:schemeClr val="tx1"/>
-                  </a:solidFill>
-                  <a:latin typeface="Arial" charset="0"/>
-                  <a:ea typeface="ＭＳ Ｐゴシック" charset="0"/>
-                  <a:cs typeface="ＭＳ Ｐゴシック" charset="0"/>
-                </a:defRPr>
-              </a:lvl1pPr>
-              <a:lvl2pPr marL="742950" indent="-285750" eaLnBrk="0" hangingPunct="0">
-                <a:defRPr sz="2400">
-                  <a:solidFill>
-                    <a:schemeClr val="tx1"/>
-                  </a:solidFill>
-                  <a:latin typeface="Arial" charset="0"/>
-                  <a:ea typeface="ＭＳ Ｐゴシック" charset="0"/>
-                </a:defRPr>
-              </a:lvl2pPr>
-              <a:lvl3pPr marL="1143000" indent="-228600" eaLnBrk="0" hangingPunct="0">
-                <a:defRPr sz="2400">
-                  <a:solidFill>
-                    <a:schemeClr val="tx1"/>
-                  </a:solidFill>
-                  <a:latin typeface="Arial" charset="0"/>
-                  <a:ea typeface="ＭＳ Ｐゴシック" charset="0"/>
-                </a:defRPr>
-              </a:lvl3pPr>
-              <a:lvl4pPr marL="1600200" indent="-228600" eaLnBrk="0" hangingPunct="0">
-                <a:defRPr sz="2400">
-                  <a:solidFill>
-                    <a:schemeClr val="tx1"/>
-                  </a:solidFill>
-                  <a:latin typeface="Arial" charset="0"/>
-                  <a:ea typeface="ＭＳ Ｐゴシック" charset="0"/>
-                </a:defRPr>
-              </a:lvl4pPr>
-              <a:lvl5pPr marL="2057400" indent="-228600" eaLnBrk="0" hangingPunct="0">
-                <a:defRPr sz="2400">
-                  <a:solidFill>
-                    <a:schemeClr val="tx1"/>
-                  </a:solidFill>
-                  <a:latin typeface="Arial" charset="0"/>
-                  <a:ea typeface="ＭＳ Ｐゴシック" charset="0"/>
-                </a:defRPr>
-              </a:lvl5pPr>
-              <a:lvl6pPr marL="2514600" indent="-228600" eaLnBrk="0" fontAlgn="base" hangingPunct="0">
-                <a:spcBef>
-                  <a:spcPct val="0"/>
-                </a:spcBef>
-                <a:spcAft>
-                  <a:spcPct val="0"/>
-                </a:spcAft>
-                <a:defRPr sz="2400">
-                  <a:solidFill>
-                    <a:schemeClr val="tx1"/>
-                  </a:solidFill>
-                  <a:latin typeface="Arial" charset="0"/>
-                  <a:ea typeface="ＭＳ Ｐゴシック" charset="0"/>
-                </a:defRPr>
-              </a:lvl6pPr>
-              <a:lvl7pPr marL="2971800" indent="-228600" eaLnBrk="0" fontAlgn="base" hangingPunct="0">
-                <a:spcBef>
-                  <a:spcPct val="0"/>
-                </a:spcBef>
-                <a:spcAft>
-                  <a:spcPct val="0"/>
-                </a:spcAft>
-                <a:defRPr sz="2400">
-                  <a:solidFill>
-                    <a:schemeClr val="tx1"/>
-                  </a:solidFill>
-                  <a:latin typeface="Arial" charset="0"/>
-                  <a:ea typeface="ＭＳ Ｐゴシック" charset="0"/>
-                </a:defRPr>
-              </a:lvl7pPr>
-              <a:lvl8pPr marL="3429000" indent="-228600" eaLnBrk="0" fontAlgn="base" hangingPunct="0">
-                <a:spcBef>
-                  <a:spcPct val="0"/>
-                </a:spcBef>
-                <a:spcAft>
-                  <a:spcPct val="0"/>
-                </a:spcAft>
-                <a:defRPr sz="2400">
-                  <a:solidFill>
-                    <a:schemeClr val="tx1"/>
-                  </a:solidFill>
-                  <a:latin typeface="Arial" charset="0"/>
-                  <a:ea typeface="ＭＳ Ｐゴシック" charset="0"/>
-                </a:defRPr>
-              </a:lvl8pPr>
-              <a:lvl9pPr marL="3886200" indent="-228600" eaLnBrk="0" fontAlgn="base" hangingPunct="0">
-                <a:spcBef>
-                  <a:spcPct val="0"/>
-                </a:spcBef>
-                <a:spcAft>
-                  <a:spcPct val="0"/>
-                </a:spcAft>
-                <a:defRPr sz="2400">
-                  <a:solidFill>
-                    <a:schemeClr val="tx1"/>
-                  </a:solidFill>
-                  <a:latin typeface="Arial" charset="0"/>
-                  <a:ea typeface="ＭＳ Ｐゴシック" charset="0"/>
-                </a:defRPr>
-              </a:lvl9pPr>
-            </a:lstStyle>
-            <a:p>
-              <a:pPr algn="ctr" eaLnBrk="1" hangingPunct="1"/>
-              <a:r>
-                <a:rPr lang="en-US" sz="1400" b="1"/>
-                <a:t>Transcript compilation</a:t>
-              </a:r>
-            </a:p>
-          </p:txBody>
-        </p:sp>
-      </p:grpSp>
-      <p:grpSp>
-        <p:nvGrpSpPr>
-          <p:cNvPr id="25607" name="Group 19"/>
-          <p:cNvGrpSpPr>
-            <a:grpSpLocks/>
-          </p:cNvGrpSpPr>
+          </a:ln>
+          <a:extLst>
+            <a:ext uri="{909E8E84-426E-40dd-AFC4-6F175D3DCCD1}">
+              <a14:hiddenFill xmlns:a14="http://schemas.microsoft.com/office/drawing/2010/main">
+                <a:solidFill>
+                  <a:srgbClr val="FFFFFF"/>
+                </a:solidFill>
+              </a14:hiddenFill>
+            </a:ext>
+            <a:ext uri="{91240B29-F687-4f45-9708-019B960494DF}">
+              <a14:hiddenLine xmlns:a14="http://schemas.microsoft.com/office/drawing/2010/main" w="9525">
+                <a:solidFill>
+                  <a:srgbClr val="000000"/>
+                </a:solidFill>
+                <a:miter lim="800000"/>
+                <a:headEnd/>
+                <a:tailEnd/>
+              </a14:hiddenLine>
+            </a:ext>
+          </a:extLst>
+        </p:spPr>
+        <p:txBody>
+          <a:bodyPr>
+            <a:spAutoFit/>
+          </a:bodyPr>
+          <a:lstStyle>
+            <a:lvl1pPr eaLnBrk="0" hangingPunct="0">
+              <a:defRPr sz="2400">
+                <a:solidFill>
+                  <a:schemeClr val="tx1"/>
+                </a:solidFill>
+                <a:latin typeface="Arial" charset="0"/>
+                <a:ea typeface="ＭＳ Ｐゴシック" charset="0"/>
+                <a:cs typeface="ＭＳ Ｐゴシック" charset="0"/>
+              </a:defRPr>
+            </a:lvl1pPr>
+            <a:lvl2pPr marL="742950" indent="-285750" eaLnBrk="0" hangingPunct="0">
+              <a:defRPr sz="2400">
+                <a:solidFill>
+                  <a:schemeClr val="tx1"/>
+                </a:solidFill>
+                <a:latin typeface="Arial" charset="0"/>
+                <a:ea typeface="ＭＳ Ｐゴシック" charset="0"/>
+              </a:defRPr>
+            </a:lvl2pPr>
+            <a:lvl3pPr marL="1143000" indent="-228600" eaLnBrk="0" hangingPunct="0">
+              <a:defRPr sz="2400">
+                <a:solidFill>
+                  <a:schemeClr val="tx1"/>
+                </a:solidFill>
+                <a:latin typeface="Arial" charset="0"/>
+                <a:ea typeface="ＭＳ Ｐゴシック" charset="0"/>
+              </a:defRPr>
+            </a:lvl3pPr>
+            <a:lvl4pPr marL="1600200" indent="-228600" eaLnBrk="0" hangingPunct="0">
+              <a:defRPr sz="2400">
+                <a:solidFill>
+                  <a:schemeClr val="tx1"/>
+                </a:solidFill>
+                <a:latin typeface="Arial" charset="0"/>
+                <a:ea typeface="ＭＳ Ｐゴシック" charset="0"/>
+              </a:defRPr>
+            </a:lvl4pPr>
+            <a:lvl5pPr marL="2057400" indent="-228600" eaLnBrk="0" hangingPunct="0">
+              <a:defRPr sz="2400">
+                <a:solidFill>
+                  <a:schemeClr val="tx1"/>
+                </a:solidFill>
+                <a:latin typeface="Arial" charset="0"/>
+                <a:ea typeface="ＭＳ Ｐゴシック" charset="0"/>
+              </a:defRPr>
+            </a:lvl5pPr>
+            <a:lvl6pPr marL="2514600" indent="-228600" eaLnBrk="0" fontAlgn="base" hangingPunct="0">
+              <a:spcBef>
+                <a:spcPct val="0"/>
+              </a:spcBef>
+              <a:spcAft>
+                <a:spcPct val="0"/>
+              </a:spcAft>
+              <a:defRPr sz="2400">
+                <a:solidFill>
+                  <a:schemeClr val="tx1"/>
+                </a:solidFill>
+                <a:latin typeface="Arial" charset="0"/>
+                <a:ea typeface="ＭＳ Ｐゴシック" charset="0"/>
+              </a:defRPr>
+            </a:lvl6pPr>
+            <a:lvl7pPr marL="2971800" indent="-228600" eaLnBrk="0" fontAlgn="base" hangingPunct="0">
+              <a:spcBef>
+                <a:spcPct val="0"/>
+              </a:spcBef>
+              <a:spcAft>
+                <a:spcPct val="0"/>
+              </a:spcAft>
+              <a:defRPr sz="2400">
+                <a:solidFill>
+                  <a:schemeClr val="tx1"/>
+                </a:solidFill>
+                <a:latin typeface="Arial" charset="0"/>
+                <a:ea typeface="ＭＳ Ｐゴシック" charset="0"/>
+              </a:defRPr>
+            </a:lvl7pPr>
+            <a:lvl8pPr marL="3429000" indent="-228600" eaLnBrk="0" fontAlgn="base" hangingPunct="0">
+              <a:spcBef>
+                <a:spcPct val="0"/>
+              </a:spcBef>
+              <a:spcAft>
+                <a:spcPct val="0"/>
+              </a:spcAft>
+              <a:defRPr sz="2400">
+                <a:solidFill>
+                  <a:schemeClr val="tx1"/>
+                </a:solidFill>
+                <a:latin typeface="Arial" charset="0"/>
+                <a:ea typeface="ＭＳ Ｐゴシック" charset="0"/>
+              </a:defRPr>
+            </a:lvl8pPr>
+            <a:lvl9pPr marL="3886200" indent="-228600" eaLnBrk="0" fontAlgn="base" hangingPunct="0">
+              <a:spcBef>
+                <a:spcPct val="0"/>
+              </a:spcBef>
+              <a:spcAft>
+                <a:spcPct val="0"/>
+              </a:spcAft>
+              <a:defRPr sz="2400">
+                <a:solidFill>
+                  <a:schemeClr val="tx1"/>
+                </a:solidFill>
+                <a:latin typeface="Arial" charset="0"/>
+                <a:ea typeface="ＭＳ Ｐゴシック" charset="0"/>
+              </a:defRPr>
+            </a:lvl9pPr>
+          </a:lstStyle>
+          <a:p>
+            <a:pPr algn="ctr" eaLnBrk="1" hangingPunct="1"/>
+            <a:r>
+              <a:rPr lang="en-US" sz="1400" b="1"/>
+              <a:t>Transcript compilation</a:t>
+            </a:r>
+          </a:p>
+        </p:txBody>
+      </p:sp>
+      <p:sp>
+        <p:nvSpPr>
+          <p:cNvPr id="10" name="Rounded Rectangle 9"/>
+          <p:cNvSpPr/>
           <p:nvPr/>
-        </p:nvGrpSpPr>
-        <p:grpSpPr bwMode="auto">
+        </p:nvSpPr>
+        <p:spPr bwMode="auto">
+          <a:xfrm>
+            <a:off x="5221288" y="2795313"/>
+            <a:ext cx="1366837" cy="719137"/>
+          </a:xfrm>
+          <a:prstGeom prst="roundRect">
+            <a:avLst/>
+          </a:prstGeom>
+        </p:spPr>
+        <p:style>
+          <a:lnRef idx="1">
+            <a:schemeClr val="accent1"/>
+          </a:lnRef>
+          <a:fillRef idx="2">
+            <a:schemeClr val="accent1"/>
+          </a:fillRef>
+          <a:effectRef idx="1">
+            <a:schemeClr val="accent1"/>
+          </a:effectRef>
+          <a:fontRef idx="minor">
+            <a:schemeClr val="dk1"/>
+          </a:fontRef>
+        </p:style>
+        <p:txBody>
+          <a:bodyPr anchor="ctr"/>
+          <a:lstStyle/>
+          <a:p>
+            <a:pPr algn="ctr">
+              <a:defRPr/>
+            </a:pPr>
+            <a:r>
+              <a:rPr lang="en-US" sz="1200" dirty="0" err="1" smtClean="0">
+                <a:solidFill>
+                  <a:schemeClr val="tx1"/>
+                </a:solidFill>
+              </a:rPr>
+              <a:t>StringTie</a:t>
+            </a:r>
+            <a:endParaRPr lang="en-US" sz="1200" dirty="0">
+              <a:solidFill>
+                <a:schemeClr val="tx1"/>
+              </a:solidFill>
+            </a:endParaRPr>
+          </a:p>
+        </p:txBody>
+      </p:sp>
+      <p:sp>
+        <p:nvSpPr>
+          <p:cNvPr id="25625" name="TextBox 14"/>
+          <p:cNvSpPr txBox="1">
+            <a:spLocks noChangeArrowheads="1"/>
+          </p:cNvSpPr>
+          <p:nvPr/>
+        </p:nvSpPr>
+        <p:spPr bwMode="auto">
           <a:xfrm>
             <a:off x="5076825" y="2120625"/>
-            <a:ext cx="1655763" cy="1393825"/>
-            <a:chOff x="5148064" y="1818692"/>
-            <a:chExt cx="1656184" cy="1394284"/>
+            <a:ext cx="1655763" cy="523220"/>
           </a:xfrm>
-        </p:grpSpPr>
-        <p:sp>
-          <p:nvSpPr>
-            <p:cNvPr id="10" name="Rounded Rectangle 9"/>
-            <p:cNvSpPr/>
-            <p:nvPr/>
-          </p:nvSpPr>
-          <p:spPr>
-            <a:xfrm>
-              <a:off x="5292564" y="2493602"/>
-              <a:ext cx="1367185" cy="719374"/>
-            </a:xfrm>
-            <a:prstGeom prst="roundRect">
-              <a:avLst/>
-            </a:prstGeom>
-          </p:spPr>
-          <p:style>
-            <a:lnRef idx="1">
-              <a:schemeClr val="accent1"/>
-            </a:lnRef>
-            <a:fillRef idx="2">
-              <a:schemeClr val="accent1"/>
-            </a:fillRef>
-            <a:effectRef idx="1">
-              <a:schemeClr val="accent1"/>
-            </a:effectRef>
-            <a:fontRef idx="minor">
-              <a:schemeClr val="dk1"/>
-            </a:fontRef>
-          </p:style>
-          <p:txBody>
-            <a:bodyPr anchor="ctr"/>
-            <a:lstStyle/>
-            <a:p>
-              <a:pPr algn="ctr">
-                <a:defRPr/>
-              </a:pPr>
-              <a:r>
-                <a:rPr lang="en-US" sz="1200" dirty="0">
-                  <a:solidFill>
-                    <a:schemeClr val="tx1"/>
-                  </a:solidFill>
-                </a:rPr>
-                <a:t>Cufflinks (</a:t>
-              </a:r>
-              <a:r>
-                <a:rPr lang="en-US" sz="1200" dirty="0" err="1">
-                  <a:solidFill>
-                    <a:schemeClr val="tx1"/>
-                  </a:solidFill>
-                </a:rPr>
-                <a:t>cuffmerge</a:t>
-              </a:r>
-              <a:r>
-                <a:rPr lang="en-US" sz="1200" dirty="0">
-                  <a:solidFill>
-                    <a:schemeClr val="tx1"/>
-                  </a:solidFill>
-                </a:rPr>
-                <a:t>)</a:t>
-              </a:r>
-            </a:p>
-          </p:txBody>
-        </p:sp>
-        <p:sp>
-          <p:nvSpPr>
-            <p:cNvPr id="25625" name="TextBox 14"/>
-            <p:cNvSpPr txBox="1">
-              <a:spLocks noChangeArrowheads="1"/>
-            </p:cNvSpPr>
-            <p:nvPr/>
-          </p:nvSpPr>
-          <p:spPr bwMode="auto">
-            <a:xfrm>
-              <a:off x="5148064" y="1818692"/>
-              <a:ext cx="1656184" cy="523220"/>
-            </a:xfrm>
-            <a:prstGeom prst="rect">
-              <a:avLst/>
-            </a:prstGeom>
+          <a:prstGeom prst="rect">
+            <a:avLst/>
+          </a:prstGeom>
+          <a:noFill/>
+          <a:ln>
             <a:noFill/>
-            <a:ln>
-              <a:noFill/>
-            </a:ln>
-            <a:extLst>
-              <a:ext uri="{909E8E84-426E-40dd-AFC4-6F175D3DCCD1}">
-                <a14:hiddenFill xmlns:a14="http://schemas.microsoft.com/office/drawing/2010/main">
-                  <a:solidFill>
-                    <a:srgbClr val="FFFFFF"/>
-                  </a:solidFill>
-                </a14:hiddenFill>
-              </a:ext>
-              <a:ext uri="{91240B29-F687-4f45-9708-019B960494DF}">
-                <a14:hiddenLine xmlns:a14="http://schemas.microsoft.com/office/drawing/2010/main" w="9525">
-                  <a:solidFill>
-                    <a:srgbClr val="000000"/>
-                  </a:solidFill>
-                  <a:miter lim="800000"/>
-                  <a:headEnd/>
-                  <a:tailEnd/>
-                </a14:hiddenLine>
-              </a:ext>
-            </a:extLst>
-          </p:spPr>
-          <p:txBody>
-            <a:bodyPr>
-              <a:spAutoFit/>
-            </a:bodyPr>
-            <a:lstStyle>
-              <a:lvl1pPr eaLnBrk="0" hangingPunct="0">
-                <a:defRPr sz="2400">
-                  <a:solidFill>
-                    <a:schemeClr val="tx1"/>
-                  </a:solidFill>
-                  <a:latin typeface="Arial" charset="0"/>
-                  <a:ea typeface="ＭＳ Ｐゴシック" charset="0"/>
-                  <a:cs typeface="ＭＳ Ｐゴシック" charset="0"/>
-                </a:defRPr>
-              </a:lvl1pPr>
-              <a:lvl2pPr marL="742950" indent="-285750" eaLnBrk="0" hangingPunct="0">
-                <a:defRPr sz="2400">
-                  <a:solidFill>
-                    <a:schemeClr val="tx1"/>
-                  </a:solidFill>
-                  <a:latin typeface="Arial" charset="0"/>
-                  <a:ea typeface="ＭＳ Ｐゴシック" charset="0"/>
-                </a:defRPr>
-              </a:lvl2pPr>
-              <a:lvl3pPr marL="1143000" indent="-228600" eaLnBrk="0" hangingPunct="0">
-                <a:defRPr sz="2400">
-                  <a:solidFill>
-                    <a:schemeClr val="tx1"/>
-                  </a:solidFill>
-                  <a:latin typeface="Arial" charset="0"/>
-                  <a:ea typeface="ＭＳ Ｐゴシック" charset="0"/>
-                </a:defRPr>
-              </a:lvl3pPr>
-              <a:lvl4pPr marL="1600200" indent="-228600" eaLnBrk="0" hangingPunct="0">
-                <a:defRPr sz="2400">
-                  <a:solidFill>
-                    <a:schemeClr val="tx1"/>
-                  </a:solidFill>
-                  <a:latin typeface="Arial" charset="0"/>
-                  <a:ea typeface="ＭＳ Ｐゴシック" charset="0"/>
-                </a:defRPr>
-              </a:lvl4pPr>
-              <a:lvl5pPr marL="2057400" indent="-228600" eaLnBrk="0" hangingPunct="0">
-                <a:defRPr sz="2400">
-                  <a:solidFill>
-                    <a:schemeClr val="tx1"/>
-                  </a:solidFill>
-                  <a:latin typeface="Arial" charset="0"/>
-                  <a:ea typeface="ＭＳ Ｐゴシック" charset="0"/>
-                </a:defRPr>
-              </a:lvl5pPr>
-              <a:lvl6pPr marL="2514600" indent="-228600" eaLnBrk="0" fontAlgn="base" hangingPunct="0">
-                <a:spcBef>
-                  <a:spcPct val="0"/>
-                </a:spcBef>
-                <a:spcAft>
-                  <a:spcPct val="0"/>
-                </a:spcAft>
-                <a:defRPr sz="2400">
-                  <a:solidFill>
-                    <a:schemeClr val="tx1"/>
-                  </a:solidFill>
-                  <a:latin typeface="Arial" charset="0"/>
-                  <a:ea typeface="ＭＳ Ｐゴシック" charset="0"/>
-                </a:defRPr>
-              </a:lvl6pPr>
-              <a:lvl7pPr marL="2971800" indent="-228600" eaLnBrk="0" fontAlgn="base" hangingPunct="0">
-                <a:spcBef>
-                  <a:spcPct val="0"/>
-                </a:spcBef>
-                <a:spcAft>
-                  <a:spcPct val="0"/>
-                </a:spcAft>
-                <a:defRPr sz="2400">
-                  <a:solidFill>
-                    <a:schemeClr val="tx1"/>
-                  </a:solidFill>
-                  <a:latin typeface="Arial" charset="0"/>
-                  <a:ea typeface="ＭＳ Ｐゴシック" charset="0"/>
-                </a:defRPr>
-              </a:lvl7pPr>
-              <a:lvl8pPr marL="3429000" indent="-228600" eaLnBrk="0" fontAlgn="base" hangingPunct="0">
-                <a:spcBef>
-                  <a:spcPct val="0"/>
-                </a:spcBef>
-                <a:spcAft>
-                  <a:spcPct val="0"/>
-                </a:spcAft>
-                <a:defRPr sz="2400">
-                  <a:solidFill>
-                    <a:schemeClr val="tx1"/>
-                  </a:solidFill>
-                  <a:latin typeface="Arial" charset="0"/>
-                  <a:ea typeface="ＭＳ Ｐゴシック" charset="0"/>
-                </a:defRPr>
-              </a:lvl8pPr>
-              <a:lvl9pPr marL="3886200" indent="-228600" eaLnBrk="0" fontAlgn="base" hangingPunct="0">
-                <a:spcBef>
-                  <a:spcPct val="0"/>
-                </a:spcBef>
-                <a:spcAft>
-                  <a:spcPct val="0"/>
-                </a:spcAft>
-                <a:defRPr sz="2400">
-                  <a:solidFill>
-                    <a:schemeClr val="tx1"/>
-                  </a:solidFill>
-                  <a:latin typeface="Arial" charset="0"/>
-                  <a:ea typeface="ＭＳ Ｐゴシック" charset="0"/>
-                </a:defRPr>
-              </a:lvl9pPr>
-            </a:lstStyle>
-            <a:p>
-              <a:pPr algn="ctr" eaLnBrk="1" hangingPunct="1"/>
-              <a:r>
-                <a:rPr lang="en-US" sz="1400" b="1"/>
-                <a:t>Gene identification</a:t>
-              </a:r>
-            </a:p>
-          </p:txBody>
-        </p:sp>
-      </p:grpSp>
+          </a:ln>
+          <a:extLst>
+            <a:ext uri="{909E8E84-426E-40dd-AFC4-6F175D3DCCD1}">
+              <a14:hiddenFill xmlns:a14="http://schemas.microsoft.com/office/drawing/2010/main">
+                <a:solidFill>
+                  <a:srgbClr val="FFFFFF"/>
+                </a:solidFill>
+              </a14:hiddenFill>
+            </a:ext>
+            <a:ext uri="{91240B29-F687-4f45-9708-019B960494DF}">
+              <a14:hiddenLine xmlns:a14="http://schemas.microsoft.com/office/drawing/2010/main" w="9525">
+                <a:solidFill>
+                  <a:srgbClr val="000000"/>
+                </a:solidFill>
+                <a:miter lim="800000"/>
+                <a:headEnd/>
+                <a:tailEnd/>
+              </a14:hiddenLine>
+            </a:ext>
+          </a:extLst>
+        </p:spPr>
+        <p:txBody>
+          <a:bodyPr>
+            <a:spAutoFit/>
+          </a:bodyPr>
+          <a:lstStyle>
+            <a:lvl1pPr eaLnBrk="0" hangingPunct="0">
+              <a:defRPr sz="2400">
+                <a:solidFill>
+                  <a:schemeClr val="tx1"/>
+                </a:solidFill>
+                <a:latin typeface="Arial" charset="0"/>
+                <a:ea typeface="ＭＳ Ｐゴシック" charset="0"/>
+                <a:cs typeface="ＭＳ Ｐゴシック" charset="0"/>
+              </a:defRPr>
+            </a:lvl1pPr>
+            <a:lvl2pPr marL="742950" indent="-285750" eaLnBrk="0" hangingPunct="0">
+              <a:defRPr sz="2400">
+                <a:solidFill>
+                  <a:schemeClr val="tx1"/>
+                </a:solidFill>
+                <a:latin typeface="Arial" charset="0"/>
+                <a:ea typeface="ＭＳ Ｐゴシック" charset="0"/>
+              </a:defRPr>
+            </a:lvl2pPr>
+            <a:lvl3pPr marL="1143000" indent="-228600" eaLnBrk="0" hangingPunct="0">
+              <a:defRPr sz="2400">
+                <a:solidFill>
+                  <a:schemeClr val="tx1"/>
+                </a:solidFill>
+                <a:latin typeface="Arial" charset="0"/>
+                <a:ea typeface="ＭＳ Ｐゴシック" charset="0"/>
+              </a:defRPr>
+            </a:lvl3pPr>
+            <a:lvl4pPr marL="1600200" indent="-228600" eaLnBrk="0" hangingPunct="0">
+              <a:defRPr sz="2400">
+                <a:solidFill>
+                  <a:schemeClr val="tx1"/>
+                </a:solidFill>
+                <a:latin typeface="Arial" charset="0"/>
+                <a:ea typeface="ＭＳ Ｐゴシック" charset="0"/>
+              </a:defRPr>
+            </a:lvl4pPr>
+            <a:lvl5pPr marL="2057400" indent="-228600" eaLnBrk="0" hangingPunct="0">
+              <a:defRPr sz="2400">
+                <a:solidFill>
+                  <a:schemeClr val="tx1"/>
+                </a:solidFill>
+                <a:latin typeface="Arial" charset="0"/>
+                <a:ea typeface="ＭＳ Ｐゴシック" charset="0"/>
+              </a:defRPr>
+            </a:lvl5pPr>
+            <a:lvl6pPr marL="2514600" indent="-228600" eaLnBrk="0" fontAlgn="base" hangingPunct="0">
+              <a:spcBef>
+                <a:spcPct val="0"/>
+              </a:spcBef>
+              <a:spcAft>
+                <a:spcPct val="0"/>
+              </a:spcAft>
+              <a:defRPr sz="2400">
+                <a:solidFill>
+                  <a:schemeClr val="tx1"/>
+                </a:solidFill>
+                <a:latin typeface="Arial" charset="0"/>
+                <a:ea typeface="ＭＳ Ｐゴシック" charset="0"/>
+              </a:defRPr>
+            </a:lvl6pPr>
+            <a:lvl7pPr marL="2971800" indent="-228600" eaLnBrk="0" fontAlgn="base" hangingPunct="0">
+              <a:spcBef>
+                <a:spcPct val="0"/>
+              </a:spcBef>
+              <a:spcAft>
+                <a:spcPct val="0"/>
+              </a:spcAft>
+              <a:defRPr sz="2400">
+                <a:solidFill>
+                  <a:schemeClr val="tx1"/>
+                </a:solidFill>
+                <a:latin typeface="Arial" charset="0"/>
+                <a:ea typeface="ＭＳ Ｐゴシック" charset="0"/>
+              </a:defRPr>
+            </a:lvl7pPr>
+            <a:lvl8pPr marL="3429000" indent="-228600" eaLnBrk="0" fontAlgn="base" hangingPunct="0">
+              <a:spcBef>
+                <a:spcPct val="0"/>
+              </a:spcBef>
+              <a:spcAft>
+                <a:spcPct val="0"/>
+              </a:spcAft>
+              <a:defRPr sz="2400">
+                <a:solidFill>
+                  <a:schemeClr val="tx1"/>
+                </a:solidFill>
+                <a:latin typeface="Arial" charset="0"/>
+                <a:ea typeface="ＭＳ Ｐゴシック" charset="0"/>
+              </a:defRPr>
+            </a:lvl8pPr>
+            <a:lvl9pPr marL="3886200" indent="-228600" eaLnBrk="0" fontAlgn="base" hangingPunct="0">
+              <a:spcBef>
+                <a:spcPct val="0"/>
+              </a:spcBef>
+              <a:spcAft>
+                <a:spcPct val="0"/>
+              </a:spcAft>
+              <a:defRPr sz="2400">
+                <a:solidFill>
+                  <a:schemeClr val="tx1"/>
+                </a:solidFill>
+                <a:latin typeface="Arial" charset="0"/>
+                <a:ea typeface="ＭＳ Ｐゴシック" charset="0"/>
+              </a:defRPr>
+            </a:lvl9pPr>
+          </a:lstStyle>
+          <a:p>
+            <a:pPr algn="ctr" eaLnBrk="1" hangingPunct="1"/>
+            <a:r>
+              <a:rPr lang="en-US" sz="1400" b="1" dirty="0" smtClean="0"/>
+              <a:t>Expression estimate</a:t>
+            </a:r>
+            <a:endParaRPr lang="en-US" sz="1400" b="1" dirty="0"/>
+          </a:p>
+        </p:txBody>
+      </p:sp>
       <p:sp>
         <p:nvSpPr>
           <p:cNvPr id="11" name="Rounded Rectangle 10"/>
@@ -13963,31 +13944,18 @@
               <a:defRPr/>
             </a:pPr>
             <a:r>
-              <a:rPr lang="en-US" sz="1200" dirty="0" err="1">
+              <a:rPr lang="en-US" sz="1200" dirty="0" err="1" smtClean="0">
                 <a:solidFill>
                   <a:schemeClr val="tx1"/>
                 </a:solidFill>
               </a:rPr>
-              <a:t>Cuffdiff</a:t>
+              <a:t>Ballgown</a:t>
             </a:r>
             <a:endParaRPr lang="en-US" sz="1200" dirty="0">
               <a:solidFill>
                 <a:schemeClr val="tx1"/>
               </a:solidFill>
             </a:endParaRPr>
-          </a:p>
-          <a:p>
-            <a:pPr algn="ctr">
-              <a:defRPr/>
-            </a:pPr>
-            <a:r>
-              <a:rPr lang="en-US" sz="1200" dirty="0">
-                <a:solidFill>
-                  <a:schemeClr val="tx1"/>
-                </a:solidFill>
-              </a:rPr>
-              <a:t>(A:B comparison)</a:t>
-            </a:r>
           </a:p>
         </p:txBody>
       </p:sp>
@@ -14189,12 +14157,20 @@
               <a:defRPr/>
             </a:pPr>
             <a:r>
-              <a:rPr lang="en-US" sz="1200" dirty="0" err="1">
+              <a:rPr lang="en-US" sz="1200" dirty="0" err="1" smtClean="0">
                 <a:solidFill>
                   <a:schemeClr val="tx1"/>
                 </a:solidFill>
               </a:rPr>
-              <a:t>CummRbund</a:t>
+              <a:t>Ballgown</a:t>
+            </a:r>
+            <a:r>
+              <a:rPr lang="en-US" sz="1200" dirty="0" smtClean="0">
+                <a:solidFill>
+                  <a:schemeClr val="tx1"/>
+                </a:solidFill>
+              </a:rPr>
+              <a:t> &amp; R</a:t>
             </a:r>
             <a:endParaRPr lang="en-US" sz="1200" dirty="0">
               <a:solidFill>
@@ -14878,82 +14854,6 @@
               <a:rPr lang="en-US" sz="1400" b="1"/>
               <a:t>Inputs</a:t>
             </a:r>
-          </a:p>
-        </p:txBody>
-      </p:sp>
-      <p:sp>
-        <p:nvSpPr>
-          <p:cNvPr id="44" name="Rounded Rectangle 43"/>
-          <p:cNvSpPr/>
-          <p:nvPr/>
-        </p:nvSpPr>
-        <p:spPr>
-          <a:xfrm>
-            <a:off x="3348038" y="1930125"/>
-            <a:ext cx="5184775" cy="1800225"/>
-          </a:xfrm>
-          <a:prstGeom prst="roundRect">
-            <a:avLst/>
-          </a:prstGeom>
-          <a:gradFill flip="none" rotWithShape="1">
-            <a:gsLst>
-              <a:gs pos="0">
-                <a:schemeClr val="dk1">
-                  <a:tint val="50000"/>
-                  <a:satMod val="300000"/>
-                  <a:alpha val="13000"/>
-                </a:schemeClr>
-              </a:gs>
-              <a:gs pos="35000">
-                <a:schemeClr val="dk1">
-                  <a:tint val="37000"/>
-                  <a:satMod val="300000"/>
-                  <a:alpha val="13000"/>
-                </a:schemeClr>
-              </a:gs>
-              <a:gs pos="100000">
-                <a:schemeClr val="dk1">
-                  <a:tint val="15000"/>
-                  <a:satMod val="350000"/>
-                  <a:alpha val="13000"/>
-                </a:schemeClr>
-              </a:gs>
-            </a:gsLst>
-            <a:lin ang="16200000" scaled="1"/>
-            <a:tileRect/>
-          </a:gradFill>
-          <a:ln>
-            <a:prstDash val="dash"/>
-          </a:ln>
-        </p:spPr>
-        <p:style>
-          <a:lnRef idx="1">
-            <a:schemeClr val="dk1"/>
-          </a:lnRef>
-          <a:fillRef idx="2">
-            <a:schemeClr val="dk1"/>
-          </a:fillRef>
-          <a:effectRef idx="1">
-            <a:schemeClr val="dk1"/>
-          </a:effectRef>
-          <a:fontRef idx="minor">
-            <a:schemeClr val="dk1"/>
-          </a:fontRef>
-        </p:style>
-        <p:txBody>
-          <a:bodyPr anchor="ctr"/>
-          <a:lstStyle/>
-          <a:p>
-            <a:pPr algn="ctr">
-              <a:defRPr/>
-            </a:pPr>
-            <a:endParaRPr lang="en-US">
-              <a:ln w="76200" cmpd="sng">
-                <a:noFill/>
-                <a:prstDash val="dot"/>
-              </a:ln>
-              <a:noFill/>
-            </a:endParaRPr>
           </a:p>
         </p:txBody>
       </p:sp>

</xml_diff>